<commit_message>
Update Nuevo Presentación de Microsoft PowerPoint.pptx
</commit_message>
<xml_diff>
--- a/tarea 2/DATA/Nuevo Presentación de Microsoft PowerPoint.pptx
+++ b/tarea 2/DATA/Nuevo Presentación de Microsoft PowerPoint.pptx
@@ -2,8 +2,14 @@
 <file path=ppt/presentation.xml><?xml version="1.0" encoding="utf-8"?>
 <p:presentation xmlns:a="http://schemas.openxmlformats.org/drawingml/2006/main" xmlns:r="http://schemas.openxmlformats.org/officeDocument/2006/relationships" xmlns:p="http://schemas.openxmlformats.org/presentationml/2006/main" saveSubsetFonts="1">
   <p:sldMasterIdLst>
-    <p:sldMasterId id="2147483648" r:id="rId1"/>
+    <p:sldMasterId id="2147483732" r:id="rId1"/>
   </p:sldMasterIdLst>
+  <p:sldIdLst>
+    <p:sldId id="256" r:id="rId2"/>
+    <p:sldId id="257" r:id="rId3"/>
+    <p:sldId id="258" r:id="rId4"/>
+    <p:sldId id="259" r:id="rId5"/>
+  </p:sldIdLst>
   <p:sldSz cx="9144000" cy="6858000" type="screen4x3"/>
   <p:notesSz cx="6858000" cy="9144000"/>
   <p:defaultTextStyle>
@@ -105,7 +111,7 @@
 </file>
 
 <file path=ppt/slideLayouts/slideLayout1.xml><?xml version="1.0" encoding="utf-8"?>
-<p:sldLayout xmlns:a="http://schemas.openxmlformats.org/drawingml/2006/main" xmlns:r="http://schemas.openxmlformats.org/officeDocument/2006/relationships" xmlns:p="http://schemas.openxmlformats.org/presentationml/2006/main" type="title" preserve="1">
+<p:sldLayout xmlns:a="http://schemas.openxmlformats.org/drawingml/2006/main" xmlns:r="http://schemas.openxmlformats.org/officeDocument/2006/relationships" xmlns:p="http://schemas.openxmlformats.org/presentationml/2006/main" showMasterSp="0" type="title" preserve="1">
   <p:cSld name="Diapositiva de título">
     <p:spTree>
       <p:nvGrpSpPr>
@@ -123,58 +129,122 @@
       </p:grpSpPr>
       <p:sp>
         <p:nvSpPr>
-          <p:cNvPr id="2" name="1 Título"/>
-          <p:cNvSpPr>
-            <a:spLocks noGrp="1"/>
-          </p:cNvSpPr>
-          <p:nvPr>
-            <p:ph type="ctrTitle"/>
-          </p:nvPr>
+          <p:cNvPr id="7" name="Rectangle 6"/>
+          <p:cNvSpPr/>
+          <p:nvPr/>
         </p:nvSpPr>
         <p:spPr>
           <a:xfrm>
-            <a:off x="685800" y="2130425"/>
-            <a:ext cx="7772400" cy="1470025"/>
+            <a:off x="7010400" y="152399"/>
+            <a:ext cx="1981200" cy="6556248"/>
+          </a:xfrm>
+          <a:prstGeom prst="rect">
+            <a:avLst/>
+          </a:prstGeom>
+          <a:solidFill>
+            <a:schemeClr val="accent1"/>
+          </a:solidFill>
+          <a:ln>
+            <a:noFill/>
+          </a:ln>
+        </p:spPr>
+        <p:style>
+          <a:lnRef idx="2">
+            <a:schemeClr val="accent1">
+              <a:shade val="50000"/>
+            </a:schemeClr>
+          </a:lnRef>
+          <a:fillRef idx="1">
+            <a:schemeClr val="accent1"/>
+          </a:fillRef>
+          <a:effectRef idx="0">
+            <a:schemeClr val="accent1"/>
+          </a:effectRef>
+          <a:fontRef idx="minor">
+            <a:schemeClr val="lt1"/>
+          </a:fontRef>
+        </p:style>
+        <p:txBody>
+          <a:bodyPr rtlCol="0" anchor="ctr"/>
+          <a:lstStyle/>
+          <a:p>
+            <a:pPr algn="ctr"/>
+            <a:endParaRPr lang="en-US"/>
+          </a:p>
+        </p:txBody>
+      </p:sp>
+      <p:sp>
+        <p:nvSpPr>
+          <p:cNvPr id="8" name="Rectangle 7"/>
+          <p:cNvSpPr/>
+          <p:nvPr/>
+        </p:nvSpPr>
+        <p:spPr>
+          <a:xfrm>
+            <a:off x="152400" y="153923"/>
+            <a:ext cx="6705600" cy="6553200"/>
+          </a:xfrm>
+          <a:prstGeom prst="rect">
+            <a:avLst/>
+          </a:prstGeom>
+          <a:solidFill>
+            <a:schemeClr val="tx2"/>
+          </a:solidFill>
+          <a:ln>
+            <a:noFill/>
+          </a:ln>
+        </p:spPr>
+        <p:style>
+          <a:lnRef idx="2">
+            <a:schemeClr val="accent1">
+              <a:shade val="50000"/>
+            </a:schemeClr>
+          </a:lnRef>
+          <a:fillRef idx="1">
+            <a:schemeClr val="accent1"/>
+          </a:fillRef>
+          <a:effectRef idx="0">
+            <a:schemeClr val="accent1"/>
+          </a:effectRef>
+          <a:fontRef idx="minor">
+            <a:schemeClr val="lt1"/>
+          </a:fontRef>
+        </p:style>
+        <p:txBody>
+          <a:bodyPr rtlCol="0" anchor="ctr"/>
+          <a:lstStyle/>
+          <a:p>
+            <a:pPr algn="ctr"/>
+            <a:endParaRPr lang="en-US"/>
+          </a:p>
+        </p:txBody>
+      </p:sp>
+      <p:sp>
+        <p:nvSpPr>
+          <p:cNvPr id="3" name="Subtitle 2"/>
+          <p:cNvSpPr>
+            <a:spLocks noGrp="1"/>
+          </p:cNvSpPr>
+          <p:nvPr>
+            <p:ph type="subTitle" idx="1"/>
+          </p:nvPr>
+        </p:nvSpPr>
+        <p:spPr>
+          <a:xfrm>
+            <a:off x="7010400" y="2052960"/>
+            <a:ext cx="1981200" cy="1828800"/>
           </a:xfrm>
         </p:spPr>
         <p:txBody>
-          <a:bodyPr/>
-          <a:lstStyle/>
-          <a:p>
-            <a:r>
-              <a:rPr lang="es-ES" smtClean="0"/>
-              <a:t>Haga clic para modificar el estilo de título del patrón</a:t>
-            </a:r>
-            <a:endParaRPr lang="es-ES"/>
-          </a:p>
-        </p:txBody>
-      </p:sp>
-      <p:sp>
-        <p:nvSpPr>
-          <p:cNvPr id="3" name="2 Subtítulo"/>
-          <p:cNvSpPr>
-            <a:spLocks noGrp="1"/>
-          </p:cNvSpPr>
-          <p:nvPr>
-            <p:ph type="subTitle" idx="1"/>
-          </p:nvPr>
-        </p:nvSpPr>
-        <p:spPr>
-          <a:xfrm>
-            <a:off x="1371600" y="3886200"/>
-            <a:ext cx="6400800" cy="1752600"/>
-          </a:xfrm>
-        </p:spPr>
-        <p:txBody>
-          <a:bodyPr/>
+          <a:bodyPr anchor="ctr">
+            <a:normAutofit/>
+          </a:bodyPr>
           <a:lstStyle>
-            <a:lvl1pPr marL="0" indent="0" algn="ctr">
-              <a:buNone/>
-              <a:defRPr>
+            <a:lvl1pPr marL="0" indent="0" algn="l">
+              <a:buNone/>
+              <a:defRPr sz="1900">
                 <a:solidFill>
-                  <a:schemeClr val="tx1">
-                    <a:tint val="75000"/>
-                  </a:schemeClr>
+                  <a:srgbClr val="FFFFFF"/>
                 </a:solidFill>
               </a:defRPr>
             </a:lvl1pPr>
@@ -264,13 +334,13 @@
               <a:rPr lang="es-ES" smtClean="0"/>
               <a:t>Haga clic para modificar el estilo de subtítulo del patrón</a:t>
             </a:r>
-            <a:endParaRPr lang="es-ES"/>
-          </a:p>
-        </p:txBody>
-      </p:sp>
-      <p:sp>
-        <p:nvSpPr>
-          <p:cNvPr id="4" name="3 Marcador de fecha"/>
+            <a:endParaRPr lang="en-US" dirty="0"/>
+          </a:p>
+        </p:txBody>
+      </p:sp>
+      <p:sp>
+        <p:nvSpPr>
+          <p:cNvPr id="10" name="Date Placeholder 9"/>
           <p:cNvSpPr>
             <a:spLocks noGrp="1"/>
           </p:cNvSpPr>
@@ -281,11 +351,19 @@
         <p:spPr/>
         <p:txBody>
           <a:bodyPr/>
-          <a:lstStyle/>
+          <a:lstStyle>
+            <a:lvl1pPr>
+              <a:defRPr>
+                <a:solidFill>
+                  <a:schemeClr val="bg2"/>
+                </a:solidFill>
+              </a:defRPr>
+            </a:lvl1pPr>
+          </a:lstStyle>
           <a:p>
             <a:fld id="{7A847CFC-816F-41D0-AAC0-9BF4FEBC753E}" type="datetimeFigureOut">
               <a:rPr lang="es-ES" smtClean="0"/>
-              <a:t>06/10/2006</a:t>
+              <a:t>03/04/2024</a:t>
             </a:fld>
             <a:endParaRPr lang="es-ES"/>
           </a:p>
@@ -293,43 +371,91 @@
       </p:sp>
       <p:sp>
         <p:nvSpPr>
-          <p:cNvPr id="5" name="4 Marcador de pie de página"/>
-          <p:cNvSpPr>
-            <a:spLocks noGrp="1"/>
-          </p:cNvSpPr>
-          <p:nvPr>
-            <p:ph type="ftr" sz="quarter" idx="11"/>
-          </p:nvPr>
-        </p:nvSpPr>
-        <p:spPr/>
-        <p:txBody>
-          <a:bodyPr/>
-          <a:lstStyle/>
-          <a:p>
-            <a:endParaRPr lang="es-ES"/>
-          </a:p>
-        </p:txBody>
-      </p:sp>
-      <p:sp>
-        <p:nvSpPr>
-          <p:cNvPr id="6" name="5 Marcador de número de diapositiva"/>
-          <p:cNvSpPr>
-            <a:spLocks noGrp="1"/>
-          </p:cNvSpPr>
-          <p:nvPr>
-            <p:ph type="sldNum" sz="quarter" idx="12"/>
-          </p:nvPr>
-        </p:nvSpPr>
-        <p:spPr/>
-        <p:txBody>
-          <a:bodyPr/>
-          <a:lstStyle/>
+          <p:cNvPr id="11" name="Slide Number Placeholder 10"/>
+          <p:cNvSpPr>
+            <a:spLocks noGrp="1"/>
+          </p:cNvSpPr>
+          <p:nvPr>
+            <p:ph type="sldNum" sz="quarter" idx="11"/>
+          </p:nvPr>
+        </p:nvSpPr>
+        <p:spPr/>
+        <p:txBody>
+          <a:bodyPr/>
+          <a:lstStyle>
+            <a:lvl1pPr>
+              <a:defRPr>
+                <a:solidFill>
+                  <a:srgbClr val="FFFFFF"/>
+                </a:solidFill>
+              </a:defRPr>
+            </a:lvl1pPr>
+          </a:lstStyle>
           <a:p>
             <a:fld id="{132FADFE-3B8F-471C-ABF0-DBC7717ECBBC}" type="slidenum">
               <a:rPr lang="es-ES" smtClean="0"/>
               <a:t>‹Nº›</a:t>
             </a:fld>
             <a:endParaRPr lang="es-ES"/>
+          </a:p>
+        </p:txBody>
+      </p:sp>
+      <p:sp>
+        <p:nvSpPr>
+          <p:cNvPr id="12" name="Footer Placeholder 11"/>
+          <p:cNvSpPr>
+            <a:spLocks noGrp="1"/>
+          </p:cNvSpPr>
+          <p:nvPr>
+            <p:ph type="ftr" sz="quarter" idx="12"/>
+          </p:nvPr>
+        </p:nvSpPr>
+        <p:spPr/>
+        <p:txBody>
+          <a:bodyPr/>
+          <a:lstStyle>
+            <a:lvl1pPr>
+              <a:defRPr>
+                <a:solidFill>
+                  <a:schemeClr val="bg2"/>
+                </a:solidFill>
+              </a:defRPr>
+            </a:lvl1pPr>
+          </a:lstStyle>
+          <a:p>
+            <a:endParaRPr lang="es-ES"/>
+          </a:p>
+        </p:txBody>
+      </p:sp>
+      <p:sp>
+        <p:nvSpPr>
+          <p:cNvPr id="13" name="Title 12"/>
+          <p:cNvSpPr>
+            <a:spLocks noGrp="1"/>
+          </p:cNvSpPr>
+          <p:nvPr>
+            <p:ph type="title"/>
+          </p:nvPr>
+        </p:nvSpPr>
+        <p:spPr>
+          <a:xfrm>
+            <a:off x="457200" y="2052960"/>
+            <a:ext cx="6324600" cy="1828800"/>
+          </a:xfrm>
+        </p:spPr>
+        <p:txBody>
+          <a:bodyPr/>
+          <a:lstStyle>
+            <a:lvl1pPr algn="r">
+              <a:defRPr sz="4200" spc="150" baseline="0"/>
+            </a:lvl1pPr>
+          </a:lstStyle>
+          <a:p>
+            <a:r>
+              <a:rPr lang="es-ES" smtClean="0"/>
+              <a:t>Haga clic para modificar el estilo de título del patrón</a:t>
+            </a:r>
+            <a:endParaRPr lang="en-US" dirty="0"/>
           </a:p>
         </p:txBody>
       </p:sp>
@@ -360,7 +486,7 @@
       </p:grpSpPr>
       <p:sp>
         <p:nvSpPr>
-          <p:cNvPr id="2" name="1 Título"/>
+          <p:cNvPr id="2" name="Title 1"/>
           <p:cNvSpPr>
             <a:spLocks noGrp="1"/>
           </p:cNvSpPr>
@@ -377,13 +503,13 @@
               <a:rPr lang="es-ES" smtClean="0"/>
               <a:t>Haga clic para modificar el estilo de título del patrón</a:t>
             </a:r>
-            <a:endParaRPr lang="es-ES"/>
-          </a:p>
-        </p:txBody>
-      </p:sp>
-      <p:sp>
-        <p:nvSpPr>
-          <p:cNvPr id="3" name="2 Marcador de texto vertical"/>
+            <a:endParaRPr lang="en-US"/>
+          </a:p>
+        </p:txBody>
+      </p:sp>
+      <p:sp>
+        <p:nvSpPr>
+          <p:cNvPr id="3" name="Vertical Text Placeholder 2"/>
           <p:cNvSpPr>
             <a:spLocks noGrp="1"/>
           </p:cNvSpPr>
@@ -429,13 +555,13 @@
               <a:rPr lang="es-ES" smtClean="0"/>
               <a:t>Quinto nivel</a:t>
             </a:r>
-            <a:endParaRPr lang="es-ES"/>
-          </a:p>
-        </p:txBody>
-      </p:sp>
-      <p:sp>
-        <p:nvSpPr>
-          <p:cNvPr id="4" name="3 Marcador de fecha"/>
+            <a:endParaRPr lang="en-US"/>
+          </a:p>
+        </p:txBody>
+      </p:sp>
+      <p:sp>
+        <p:nvSpPr>
+          <p:cNvPr id="4" name="Date Placeholder 3"/>
           <p:cNvSpPr>
             <a:spLocks noGrp="1"/>
           </p:cNvSpPr>
@@ -450,7 +576,7 @@
           <a:p>
             <a:fld id="{7A847CFC-816F-41D0-AAC0-9BF4FEBC753E}" type="datetimeFigureOut">
               <a:rPr lang="es-ES" smtClean="0"/>
-              <a:t>06/10/2006</a:t>
+              <a:t>03/04/2024</a:t>
             </a:fld>
             <a:endParaRPr lang="es-ES"/>
           </a:p>
@@ -458,7 +584,7 @@
       </p:sp>
       <p:sp>
         <p:nvSpPr>
-          <p:cNvPr id="5" name="4 Marcador de pie de página"/>
+          <p:cNvPr id="5" name="Footer Placeholder 4"/>
           <p:cNvSpPr>
             <a:spLocks noGrp="1"/>
           </p:cNvSpPr>
@@ -477,7 +603,7 @@
       </p:sp>
       <p:sp>
         <p:nvSpPr>
-          <p:cNvPr id="6" name="5 Marcador de número de diapositiva"/>
+          <p:cNvPr id="6" name="Slide Number Placeholder 5"/>
           <p:cNvSpPr>
             <a:spLocks noGrp="1"/>
           </p:cNvSpPr>
@@ -507,7 +633,7 @@
 </file>
 
 <file path=ppt/slideLayouts/slideLayout11.xml><?xml version="1.0" encoding="utf-8"?>
-<p:sldLayout xmlns:a="http://schemas.openxmlformats.org/drawingml/2006/main" xmlns:r="http://schemas.openxmlformats.org/officeDocument/2006/relationships" xmlns:p="http://schemas.openxmlformats.org/presentationml/2006/main" type="vertTitleAndTx" preserve="1">
+<p:sldLayout xmlns:a="http://schemas.openxmlformats.org/drawingml/2006/main" xmlns:r="http://schemas.openxmlformats.org/officeDocument/2006/relationships" xmlns:p="http://schemas.openxmlformats.org/presentationml/2006/main" showMasterSp="0" type="vertTitleAndTx" preserve="1">
   <p:cSld name="Título vertical y texto">
     <p:spTree>
       <p:nvGrpSpPr>
@@ -525,18 +651,110 @@
       </p:grpSpPr>
       <p:sp>
         <p:nvSpPr>
-          <p:cNvPr id="2" name="1 Título vertical"/>
-          <p:cNvSpPr>
-            <a:spLocks noGrp="1"/>
-          </p:cNvSpPr>
-          <p:nvPr>
-            <p:ph type="title" orient="vert"/>
-          </p:nvPr>
+          <p:cNvPr id="7" name="Rectangle 6"/>
+          <p:cNvSpPr/>
+          <p:nvPr/>
         </p:nvSpPr>
         <p:spPr>
           <a:xfrm>
-            <a:off x="6629400" y="274638"/>
-            <a:ext cx="2057400" cy="5851525"/>
+            <a:off x="152400" y="147319"/>
+            <a:ext cx="6705600" cy="6556248"/>
+          </a:xfrm>
+          <a:prstGeom prst="rect">
+            <a:avLst/>
+          </a:prstGeom>
+          <a:solidFill>
+            <a:schemeClr val="bg2"/>
+          </a:solidFill>
+          <a:ln>
+            <a:noFill/>
+          </a:ln>
+        </p:spPr>
+        <p:style>
+          <a:lnRef idx="2">
+            <a:schemeClr val="accent1">
+              <a:shade val="50000"/>
+            </a:schemeClr>
+          </a:lnRef>
+          <a:fillRef idx="1">
+            <a:schemeClr val="accent1"/>
+          </a:fillRef>
+          <a:effectRef idx="0">
+            <a:schemeClr val="accent1"/>
+          </a:effectRef>
+          <a:fontRef idx="minor">
+            <a:schemeClr val="lt1"/>
+          </a:fontRef>
+        </p:style>
+        <p:txBody>
+          <a:bodyPr rtlCol="0" anchor="ctr"/>
+          <a:lstStyle/>
+          <a:p>
+            <a:pPr algn="ctr"/>
+            <a:endParaRPr lang="en-US"/>
+          </a:p>
+        </p:txBody>
+      </p:sp>
+      <p:sp>
+        <p:nvSpPr>
+          <p:cNvPr id="8" name="Rectangle 7"/>
+          <p:cNvSpPr/>
+          <p:nvPr/>
+        </p:nvSpPr>
+        <p:spPr>
+          <a:xfrm>
+            <a:off x="7010400" y="147319"/>
+            <a:ext cx="1956046" cy="6556248"/>
+          </a:xfrm>
+          <a:prstGeom prst="rect">
+            <a:avLst/>
+          </a:prstGeom>
+          <a:solidFill>
+            <a:schemeClr val="tx2"/>
+          </a:solidFill>
+          <a:ln>
+            <a:noFill/>
+          </a:ln>
+        </p:spPr>
+        <p:style>
+          <a:lnRef idx="2">
+            <a:schemeClr val="accent1">
+              <a:shade val="50000"/>
+            </a:schemeClr>
+          </a:lnRef>
+          <a:fillRef idx="1">
+            <a:schemeClr val="accent1"/>
+          </a:fillRef>
+          <a:effectRef idx="0">
+            <a:schemeClr val="accent1"/>
+          </a:effectRef>
+          <a:fontRef idx="minor">
+            <a:schemeClr val="lt1"/>
+          </a:fontRef>
+        </p:style>
+        <p:txBody>
+          <a:bodyPr rtlCol="0" anchor="ctr"/>
+          <a:lstStyle/>
+          <a:p>
+            <a:pPr algn="ctr"/>
+            <a:endParaRPr lang="en-US"/>
+          </a:p>
+        </p:txBody>
+      </p:sp>
+      <p:sp>
+        <p:nvSpPr>
+          <p:cNvPr id="2" name="Vertical Title 1"/>
+          <p:cNvSpPr>
+            <a:spLocks noGrp="1"/>
+          </p:cNvSpPr>
+          <p:nvPr>
+            <p:ph type="title" orient="vert"/>
+          </p:nvPr>
+        </p:nvSpPr>
+        <p:spPr>
+          <a:xfrm>
+            <a:off x="7162800" y="274638"/>
+            <a:ext cx="1676400" cy="5851525"/>
           </a:xfrm>
         </p:spPr>
         <p:txBody>
@@ -547,13 +765,13 @@
               <a:rPr lang="es-ES" smtClean="0"/>
               <a:t>Haga clic para modificar el estilo de título del patrón</a:t>
             </a:r>
-            <a:endParaRPr lang="es-ES"/>
-          </a:p>
-        </p:txBody>
-      </p:sp>
-      <p:sp>
-        <p:nvSpPr>
-          <p:cNvPr id="3" name="2 Marcador de texto vertical"/>
+            <a:endParaRPr lang="en-US" dirty="0"/>
+          </a:p>
+        </p:txBody>
+      </p:sp>
+      <p:sp>
+        <p:nvSpPr>
+          <p:cNvPr id="3" name="Vertical Text Placeholder 2"/>
           <p:cNvSpPr>
             <a:spLocks noGrp="1"/>
           </p:cNvSpPr>
@@ -604,13 +822,13 @@
               <a:rPr lang="es-ES" smtClean="0"/>
               <a:t>Quinto nivel</a:t>
             </a:r>
-            <a:endParaRPr lang="es-ES"/>
-          </a:p>
-        </p:txBody>
-      </p:sp>
-      <p:sp>
-        <p:nvSpPr>
-          <p:cNvPr id="4" name="3 Marcador de fecha"/>
+            <a:endParaRPr lang="en-US" dirty="0"/>
+          </a:p>
+        </p:txBody>
+      </p:sp>
+      <p:sp>
+        <p:nvSpPr>
+          <p:cNvPr id="4" name="Date Placeholder 3"/>
           <p:cNvSpPr>
             <a:spLocks noGrp="1"/>
           </p:cNvSpPr>
@@ -625,7 +843,7 @@
           <a:p>
             <a:fld id="{7A847CFC-816F-41D0-AAC0-9BF4FEBC753E}" type="datetimeFigureOut">
               <a:rPr lang="es-ES" smtClean="0"/>
-              <a:t>06/10/2006</a:t>
+              <a:t>03/04/2024</a:t>
             </a:fld>
             <a:endParaRPr lang="es-ES"/>
           </a:p>
@@ -633,7 +851,7 @@
       </p:sp>
       <p:sp>
         <p:nvSpPr>
-          <p:cNvPr id="5" name="4 Marcador de pie de página"/>
+          <p:cNvPr id="5" name="Footer Placeholder 4"/>
           <p:cNvSpPr>
             <a:spLocks noGrp="1"/>
           </p:cNvSpPr>
@@ -652,7 +870,7 @@
       </p:sp>
       <p:sp>
         <p:nvSpPr>
-          <p:cNvPr id="6" name="5 Marcador de número de diapositiva"/>
+          <p:cNvPr id="6" name="Slide Number Placeholder 5"/>
           <p:cNvSpPr>
             <a:spLocks noGrp="1"/>
           </p:cNvSpPr>
@@ -663,7 +881,15 @@
         <p:spPr/>
         <p:txBody>
           <a:bodyPr/>
-          <a:lstStyle/>
+          <a:lstStyle>
+            <a:lvl1pPr>
+              <a:defRPr>
+                <a:solidFill>
+                  <a:schemeClr val="bg2"/>
+                </a:solidFill>
+              </a:defRPr>
+            </a:lvl1pPr>
+          </a:lstStyle>
           <a:p>
             <a:fld id="{132FADFE-3B8F-471C-ABF0-DBC7717ECBBC}" type="slidenum">
               <a:rPr lang="es-ES" smtClean="0"/>
@@ -700,30 +926,7 @@
       </p:grpSpPr>
       <p:sp>
         <p:nvSpPr>
-          <p:cNvPr id="2" name="1 Título"/>
-          <p:cNvSpPr>
-            <a:spLocks noGrp="1"/>
-          </p:cNvSpPr>
-          <p:nvPr>
-            <p:ph type="title"/>
-          </p:nvPr>
-        </p:nvSpPr>
-        <p:spPr/>
-        <p:txBody>
-          <a:bodyPr/>
-          <a:lstStyle/>
-          <a:p>
-            <a:r>
-              <a:rPr lang="es-ES" smtClean="0"/>
-              <a:t>Haga clic para modificar el estilo de título del patrón</a:t>
-            </a:r>
-            <a:endParaRPr lang="es-ES"/>
-          </a:p>
-        </p:txBody>
-      </p:sp>
-      <p:sp>
-        <p:nvSpPr>
-          <p:cNvPr id="3" name="2 Marcador de contenido"/>
+          <p:cNvPr id="3" name="Content Placeholder 2"/>
           <p:cNvSpPr>
             <a:spLocks noGrp="1"/>
           </p:cNvSpPr>
@@ -769,13 +972,13 @@
               <a:rPr lang="es-ES" smtClean="0"/>
               <a:t>Quinto nivel</a:t>
             </a:r>
-            <a:endParaRPr lang="es-ES"/>
-          </a:p>
-        </p:txBody>
-      </p:sp>
-      <p:sp>
-        <p:nvSpPr>
-          <p:cNvPr id="4" name="3 Marcador de fecha"/>
+            <a:endParaRPr lang="en-US" dirty="0"/>
+          </a:p>
+        </p:txBody>
+      </p:sp>
+      <p:sp>
+        <p:nvSpPr>
+          <p:cNvPr id="4" name="Date Placeholder 3"/>
           <p:cNvSpPr>
             <a:spLocks noGrp="1"/>
           </p:cNvSpPr>
@@ -790,7 +993,7 @@
           <a:p>
             <a:fld id="{7A847CFC-816F-41D0-AAC0-9BF4FEBC753E}" type="datetimeFigureOut">
               <a:rPr lang="es-ES" smtClean="0"/>
-              <a:t>06/10/2006</a:t>
+              <a:t>03/04/2024</a:t>
             </a:fld>
             <a:endParaRPr lang="es-ES"/>
           </a:p>
@@ -798,7 +1001,7 @@
       </p:sp>
       <p:sp>
         <p:nvSpPr>
-          <p:cNvPr id="5" name="4 Marcador de pie de página"/>
+          <p:cNvPr id="5" name="Footer Placeholder 4"/>
           <p:cNvSpPr>
             <a:spLocks noGrp="1"/>
           </p:cNvSpPr>
@@ -817,7 +1020,7 @@
       </p:sp>
       <p:sp>
         <p:nvSpPr>
-          <p:cNvPr id="6" name="5 Marcador de número de diapositiva"/>
+          <p:cNvPr id="6" name="Slide Number Placeholder 5"/>
           <p:cNvSpPr>
             <a:spLocks noGrp="1"/>
           </p:cNvSpPr>
@@ -835,6 +1038,29 @@
               <a:t>‹Nº›</a:t>
             </a:fld>
             <a:endParaRPr lang="es-ES"/>
+          </a:p>
+        </p:txBody>
+      </p:sp>
+      <p:sp>
+        <p:nvSpPr>
+          <p:cNvPr id="7" name="Title 6"/>
+          <p:cNvSpPr>
+            <a:spLocks noGrp="1"/>
+          </p:cNvSpPr>
+          <p:nvPr>
+            <p:ph type="title"/>
+          </p:nvPr>
+        </p:nvSpPr>
+        <p:spPr/>
+        <p:txBody>
+          <a:bodyPr/>
+          <a:lstStyle/>
+          <a:p>
+            <a:r>
+              <a:rPr lang="es-ES" smtClean="0"/>
+              <a:t>Haga clic para modificar el estilo de título del patrón</a:t>
+            </a:r>
+            <a:endParaRPr lang="en-US"/>
           </a:p>
         </p:txBody>
       </p:sp>
@@ -847,7 +1073,7 @@
 </file>
 
 <file path=ppt/slideLayouts/slideLayout3.xml><?xml version="1.0" encoding="utf-8"?>
-<p:sldLayout xmlns:a="http://schemas.openxmlformats.org/drawingml/2006/main" xmlns:r="http://schemas.openxmlformats.org/officeDocument/2006/relationships" xmlns:p="http://schemas.openxmlformats.org/presentationml/2006/main" type="secHead" preserve="1">
+<p:sldLayout xmlns:a="http://schemas.openxmlformats.org/drawingml/2006/main" xmlns:r="http://schemas.openxmlformats.org/officeDocument/2006/relationships" xmlns:p="http://schemas.openxmlformats.org/presentationml/2006/main" showMasterSp="0" type="secHead" preserve="1">
   <p:cSld name="Encabezado de sección">
     <p:spTree>
       <p:nvGrpSpPr>
@@ -865,62 +1091,120 @@
       </p:grpSpPr>
       <p:sp>
         <p:nvSpPr>
-          <p:cNvPr id="2" name="1 Título"/>
-          <p:cNvSpPr>
-            <a:spLocks noGrp="1"/>
-          </p:cNvSpPr>
-          <p:nvPr>
-            <p:ph type="title"/>
-          </p:nvPr>
+          <p:cNvPr id="7" name="Rectangle 6"/>
+          <p:cNvSpPr/>
+          <p:nvPr/>
         </p:nvSpPr>
         <p:spPr>
           <a:xfrm>
-            <a:off x="722313" y="4406900"/>
-            <a:ext cx="7772400" cy="1362075"/>
+            <a:off x="7010400" y="152399"/>
+            <a:ext cx="1981200" cy="6556248"/>
+          </a:xfrm>
+          <a:prstGeom prst="rect">
+            <a:avLst/>
+          </a:prstGeom>
+          <a:solidFill>
+            <a:schemeClr val="tx2"/>
+          </a:solidFill>
+          <a:ln>
+            <a:noFill/>
+          </a:ln>
+        </p:spPr>
+        <p:style>
+          <a:lnRef idx="2">
+            <a:schemeClr val="accent1">
+              <a:shade val="50000"/>
+            </a:schemeClr>
+          </a:lnRef>
+          <a:fillRef idx="1">
+            <a:schemeClr val="accent1"/>
+          </a:fillRef>
+          <a:effectRef idx="0">
+            <a:schemeClr val="accent1"/>
+          </a:effectRef>
+          <a:fontRef idx="minor">
+            <a:schemeClr val="lt1"/>
+          </a:fontRef>
+        </p:style>
+        <p:txBody>
+          <a:bodyPr rtlCol="0" anchor="ctr"/>
+          <a:lstStyle/>
+          <a:p>
+            <a:pPr algn="ctr"/>
+            <a:endParaRPr lang="en-US"/>
+          </a:p>
+        </p:txBody>
+      </p:sp>
+      <p:sp>
+        <p:nvSpPr>
+          <p:cNvPr id="8" name="Rectangle 7"/>
+          <p:cNvSpPr/>
+          <p:nvPr/>
+        </p:nvSpPr>
+        <p:spPr>
+          <a:xfrm>
+            <a:off x="152400" y="153923"/>
+            <a:ext cx="6705600" cy="6553200"/>
+          </a:xfrm>
+          <a:prstGeom prst="rect">
+            <a:avLst/>
+          </a:prstGeom>
+          <a:solidFill>
+            <a:schemeClr val="accent1"/>
+          </a:solidFill>
+          <a:ln>
+            <a:noFill/>
+          </a:ln>
+        </p:spPr>
+        <p:style>
+          <a:lnRef idx="2">
+            <a:schemeClr val="accent1">
+              <a:shade val="50000"/>
+            </a:schemeClr>
+          </a:lnRef>
+          <a:fillRef idx="1">
+            <a:schemeClr val="accent1"/>
+          </a:fillRef>
+          <a:effectRef idx="0">
+            <a:schemeClr val="accent1"/>
+          </a:effectRef>
+          <a:fontRef idx="minor">
+            <a:schemeClr val="lt1"/>
+          </a:fontRef>
+        </p:style>
+        <p:txBody>
+          <a:bodyPr rtlCol="0" anchor="ctr"/>
+          <a:lstStyle/>
+          <a:p>
+            <a:pPr algn="ctr"/>
+            <a:endParaRPr lang="en-US"/>
+          </a:p>
+        </p:txBody>
+      </p:sp>
+      <p:sp>
+        <p:nvSpPr>
+          <p:cNvPr id="3" name="Text Placeholder 2"/>
+          <p:cNvSpPr>
+            <a:spLocks noGrp="1"/>
+          </p:cNvSpPr>
+          <p:nvPr>
+            <p:ph type="body" idx="1"/>
+          </p:nvPr>
+        </p:nvSpPr>
+        <p:spPr>
+          <a:xfrm>
+            <a:off x="7162799" y="2892277"/>
+            <a:ext cx="1600201" cy="1645920"/>
           </a:xfrm>
         </p:spPr>
         <p:txBody>
-          <a:bodyPr anchor="t"/>
-          <a:lstStyle>
-            <a:lvl1pPr algn="l">
-              <a:defRPr sz="4000" b="1" cap="all"/>
-            </a:lvl1pPr>
-          </a:lstStyle>
-          <a:p>
-            <a:r>
-              <a:rPr lang="es-ES" smtClean="0"/>
-              <a:t>Haga clic para modificar el estilo de título del patrón</a:t>
-            </a:r>
-            <a:endParaRPr lang="es-ES"/>
-          </a:p>
-        </p:txBody>
-      </p:sp>
-      <p:sp>
-        <p:nvSpPr>
-          <p:cNvPr id="3" name="2 Marcador de texto"/>
-          <p:cNvSpPr>
-            <a:spLocks noGrp="1"/>
-          </p:cNvSpPr>
-          <p:nvPr>
-            <p:ph type="body" idx="1"/>
-          </p:nvPr>
-        </p:nvSpPr>
-        <p:spPr>
-          <a:xfrm>
-            <a:off x="722313" y="2906713"/>
-            <a:ext cx="7772400" cy="1500187"/>
-          </a:xfrm>
-        </p:spPr>
-        <p:txBody>
-          <a:bodyPr anchor="b"/>
+          <a:bodyPr anchor="ctr"/>
           <a:lstStyle>
             <a:lvl1pPr marL="0" indent="0">
               <a:buNone/>
               <a:defRPr sz="2000">
                 <a:solidFill>
-                  <a:schemeClr val="tx1">
-                    <a:tint val="75000"/>
-                  </a:schemeClr>
+                  <a:schemeClr val="bg2"/>
                 </a:solidFill>
               </a:defRPr>
             </a:lvl1pPr>
@@ -1016,7 +1300,7 @@
       </p:sp>
       <p:sp>
         <p:nvSpPr>
-          <p:cNvPr id="4" name="3 Marcador de fecha"/>
+          <p:cNvPr id="9" name="Date Placeholder 8"/>
           <p:cNvSpPr>
             <a:spLocks noGrp="1"/>
           </p:cNvSpPr>
@@ -1027,11 +1311,19 @@
         <p:spPr/>
         <p:txBody>
           <a:bodyPr/>
-          <a:lstStyle/>
+          <a:lstStyle>
+            <a:lvl1pPr>
+              <a:defRPr>
+                <a:solidFill>
+                  <a:srgbClr val="FFFFFF"/>
+                </a:solidFill>
+              </a:defRPr>
+            </a:lvl1pPr>
+          </a:lstStyle>
           <a:p>
             <a:fld id="{7A847CFC-816F-41D0-AAC0-9BF4FEBC753E}" type="datetimeFigureOut">
               <a:rPr lang="es-ES" smtClean="0"/>
-              <a:t>06/10/2006</a:t>
+              <a:t>03/04/2024</a:t>
             </a:fld>
             <a:endParaRPr lang="es-ES"/>
           </a:p>
@@ -1039,43 +1331,91 @@
       </p:sp>
       <p:sp>
         <p:nvSpPr>
-          <p:cNvPr id="5" name="4 Marcador de pie de página"/>
-          <p:cNvSpPr>
-            <a:spLocks noGrp="1"/>
-          </p:cNvSpPr>
-          <p:nvPr>
-            <p:ph type="ftr" sz="quarter" idx="11"/>
-          </p:nvPr>
-        </p:nvSpPr>
-        <p:spPr/>
-        <p:txBody>
-          <a:bodyPr/>
-          <a:lstStyle/>
-          <a:p>
-            <a:endParaRPr lang="es-ES"/>
-          </a:p>
-        </p:txBody>
-      </p:sp>
-      <p:sp>
-        <p:nvSpPr>
-          <p:cNvPr id="6" name="5 Marcador de número de diapositiva"/>
-          <p:cNvSpPr>
-            <a:spLocks noGrp="1"/>
-          </p:cNvSpPr>
-          <p:nvPr>
-            <p:ph type="sldNum" sz="quarter" idx="12"/>
-          </p:nvPr>
-        </p:nvSpPr>
-        <p:spPr/>
-        <p:txBody>
-          <a:bodyPr/>
-          <a:lstStyle/>
+          <p:cNvPr id="10" name="Slide Number Placeholder 9"/>
+          <p:cNvSpPr>
+            <a:spLocks noGrp="1"/>
+          </p:cNvSpPr>
+          <p:nvPr>
+            <p:ph type="sldNum" sz="quarter" idx="11"/>
+          </p:nvPr>
+        </p:nvSpPr>
+        <p:spPr/>
+        <p:txBody>
+          <a:bodyPr/>
+          <a:lstStyle>
+            <a:lvl1pPr>
+              <a:defRPr>
+                <a:solidFill>
+                  <a:schemeClr val="bg2"/>
+                </a:solidFill>
+              </a:defRPr>
+            </a:lvl1pPr>
+          </a:lstStyle>
           <a:p>
             <a:fld id="{132FADFE-3B8F-471C-ABF0-DBC7717ECBBC}" type="slidenum">
               <a:rPr lang="es-ES" smtClean="0"/>
               <a:t>‹Nº›</a:t>
             </a:fld>
             <a:endParaRPr lang="es-ES"/>
+          </a:p>
+        </p:txBody>
+      </p:sp>
+      <p:sp>
+        <p:nvSpPr>
+          <p:cNvPr id="11" name="Footer Placeholder 10"/>
+          <p:cNvSpPr>
+            <a:spLocks noGrp="1"/>
+          </p:cNvSpPr>
+          <p:nvPr>
+            <p:ph type="ftr" sz="quarter" idx="12"/>
+          </p:nvPr>
+        </p:nvSpPr>
+        <p:spPr/>
+        <p:txBody>
+          <a:bodyPr/>
+          <a:lstStyle>
+            <a:lvl1pPr>
+              <a:defRPr>
+                <a:solidFill>
+                  <a:srgbClr val="FFFFFF"/>
+                </a:solidFill>
+              </a:defRPr>
+            </a:lvl1pPr>
+          </a:lstStyle>
+          <a:p>
+            <a:endParaRPr lang="es-ES"/>
+          </a:p>
+        </p:txBody>
+      </p:sp>
+      <p:sp>
+        <p:nvSpPr>
+          <p:cNvPr id="12" name="Title 11"/>
+          <p:cNvSpPr>
+            <a:spLocks noGrp="1"/>
+          </p:cNvSpPr>
+          <p:nvPr>
+            <p:ph type="title"/>
+          </p:nvPr>
+        </p:nvSpPr>
+        <p:spPr>
+          <a:xfrm>
+            <a:off x="381000" y="2892277"/>
+            <a:ext cx="6324600" cy="1645920"/>
+          </a:xfrm>
+        </p:spPr>
+        <p:txBody>
+          <a:bodyPr/>
+          <a:lstStyle>
+            <a:lvl1pPr algn="r">
+              <a:defRPr sz="4200" spc="150" baseline="0"/>
+            </a:lvl1pPr>
+          </a:lstStyle>
+          <a:p>
+            <a:r>
+              <a:rPr lang="es-ES" smtClean="0"/>
+              <a:t>Haga clic para modificar el estilo de título del patrón</a:t>
+            </a:r>
+            <a:endParaRPr lang="en-US" dirty="0"/>
           </a:p>
         </p:txBody>
       </p:sp>
@@ -1106,30 +1446,7 @@
       </p:grpSpPr>
       <p:sp>
         <p:nvSpPr>
-          <p:cNvPr id="2" name="1 Título"/>
-          <p:cNvSpPr>
-            <a:spLocks noGrp="1"/>
-          </p:cNvSpPr>
-          <p:nvPr>
-            <p:ph type="title"/>
-          </p:nvPr>
-        </p:nvSpPr>
-        <p:spPr/>
-        <p:txBody>
-          <a:bodyPr/>
-          <a:lstStyle/>
-          <a:p>
-            <a:r>
-              <a:rPr lang="es-ES" smtClean="0"/>
-              <a:t>Haga clic para modificar el estilo de título del patrón</a:t>
-            </a:r>
-            <a:endParaRPr lang="es-ES"/>
-          </a:p>
-        </p:txBody>
-      </p:sp>
-      <p:sp>
-        <p:nvSpPr>
-          <p:cNvPr id="3" name="2 Marcador de contenido"/>
+          <p:cNvPr id="3" name="Content Placeholder 2"/>
           <p:cNvSpPr>
             <a:spLocks noGrp="1"/>
           </p:cNvSpPr>
@@ -1139,8 +1456,8 @@
         </p:nvSpPr>
         <p:spPr>
           <a:xfrm>
-            <a:off x="457200" y="1600200"/>
-            <a:ext cx="4038600" cy="4525963"/>
+            <a:off x="457200" y="1719072"/>
+            <a:ext cx="4038600" cy="4407408"/>
           </a:xfrm>
         </p:spPr>
         <p:txBody>
@@ -1208,13 +1525,13 @@
               <a:rPr lang="es-ES" smtClean="0"/>
               <a:t>Quinto nivel</a:t>
             </a:r>
-            <a:endParaRPr lang="es-ES"/>
-          </a:p>
-        </p:txBody>
-      </p:sp>
-      <p:sp>
-        <p:nvSpPr>
-          <p:cNvPr id="4" name="3 Marcador de contenido"/>
+            <a:endParaRPr lang="en-US" dirty="0"/>
+          </a:p>
+        </p:txBody>
+      </p:sp>
+      <p:sp>
+        <p:nvSpPr>
+          <p:cNvPr id="4" name="Content Placeholder 3"/>
           <p:cNvSpPr>
             <a:spLocks noGrp="1"/>
           </p:cNvSpPr>
@@ -1224,8 +1541,8 @@
         </p:nvSpPr>
         <p:spPr>
           <a:xfrm>
-            <a:off x="4648200" y="1600200"/>
-            <a:ext cx="4038600" cy="4525963"/>
+            <a:off x="4648200" y="1719072"/>
+            <a:ext cx="4038600" cy="4407408"/>
           </a:xfrm>
         </p:spPr>
         <p:txBody>
@@ -1293,13 +1610,13 @@
               <a:rPr lang="es-ES" smtClean="0"/>
               <a:t>Quinto nivel</a:t>
             </a:r>
-            <a:endParaRPr lang="es-ES"/>
-          </a:p>
-        </p:txBody>
-      </p:sp>
-      <p:sp>
-        <p:nvSpPr>
-          <p:cNvPr id="5" name="4 Marcador de fecha"/>
+            <a:endParaRPr lang="en-US" dirty="0"/>
+          </a:p>
+        </p:txBody>
+      </p:sp>
+      <p:sp>
+        <p:nvSpPr>
+          <p:cNvPr id="5" name="Date Placeholder 4"/>
           <p:cNvSpPr>
             <a:spLocks noGrp="1"/>
           </p:cNvSpPr>
@@ -1314,7 +1631,7 @@
           <a:p>
             <a:fld id="{7A847CFC-816F-41D0-AAC0-9BF4FEBC753E}" type="datetimeFigureOut">
               <a:rPr lang="es-ES" smtClean="0"/>
-              <a:t>06/10/2006</a:t>
+              <a:t>03/04/2024</a:t>
             </a:fld>
             <a:endParaRPr lang="es-ES"/>
           </a:p>
@@ -1322,7 +1639,7 @@
       </p:sp>
       <p:sp>
         <p:nvSpPr>
-          <p:cNvPr id="6" name="5 Marcador de pie de página"/>
+          <p:cNvPr id="6" name="Footer Placeholder 5"/>
           <p:cNvSpPr>
             <a:spLocks noGrp="1"/>
           </p:cNvSpPr>
@@ -1341,7 +1658,7 @@
       </p:sp>
       <p:sp>
         <p:nvSpPr>
-          <p:cNvPr id="7" name="6 Marcador de número de diapositiva"/>
+          <p:cNvPr id="7" name="Slide Number Placeholder 6"/>
           <p:cNvSpPr>
             <a:spLocks noGrp="1"/>
           </p:cNvSpPr>
@@ -1359,6 +1676,29 @@
               <a:t>‹Nº›</a:t>
             </a:fld>
             <a:endParaRPr lang="es-ES"/>
+          </a:p>
+        </p:txBody>
+      </p:sp>
+      <p:sp>
+        <p:nvSpPr>
+          <p:cNvPr id="8" name="Title 7"/>
+          <p:cNvSpPr>
+            <a:spLocks noGrp="1"/>
+          </p:cNvSpPr>
+          <p:nvPr>
+            <p:ph type="title"/>
+          </p:nvPr>
+        </p:nvSpPr>
+        <p:spPr/>
+        <p:txBody>
+          <a:bodyPr/>
+          <a:lstStyle/>
+          <a:p>
+            <a:r>
+              <a:rPr lang="es-ES" smtClean="0"/>
+              <a:t>Haga clic para modificar el estilo de título del patrón</a:t>
+            </a:r>
+            <a:endParaRPr lang="en-US"/>
           </a:p>
         </p:txBody>
       </p:sp>
@@ -1389,34 +1729,7 @@
       </p:grpSpPr>
       <p:sp>
         <p:nvSpPr>
-          <p:cNvPr id="2" name="1 Título"/>
-          <p:cNvSpPr>
-            <a:spLocks noGrp="1"/>
-          </p:cNvSpPr>
-          <p:nvPr>
-            <p:ph type="title"/>
-          </p:nvPr>
-        </p:nvSpPr>
-        <p:spPr/>
-        <p:txBody>
-          <a:bodyPr/>
-          <a:lstStyle>
-            <a:lvl1pPr>
-              <a:defRPr/>
-            </a:lvl1pPr>
-          </a:lstStyle>
-          <a:p>
-            <a:r>
-              <a:rPr lang="es-ES" smtClean="0"/>
-              <a:t>Haga clic para modificar el estilo de título del patrón</a:t>
-            </a:r>
-            <a:endParaRPr lang="es-ES"/>
-          </a:p>
-        </p:txBody>
-      </p:sp>
-      <p:sp>
-        <p:nvSpPr>
-          <p:cNvPr id="3" name="2 Marcador de texto"/>
+          <p:cNvPr id="3" name="Text Placeholder 2"/>
           <p:cNvSpPr>
             <a:spLocks noGrp="1"/>
           </p:cNvSpPr>
@@ -1426,16 +1739,20 @@
         </p:nvSpPr>
         <p:spPr>
           <a:xfrm>
-            <a:off x="457200" y="1535113"/>
+            <a:off x="457200" y="1722438"/>
             <a:ext cx="4040188" cy="639762"/>
           </a:xfrm>
         </p:spPr>
         <p:txBody>
           <a:bodyPr anchor="b"/>
           <a:lstStyle>
-            <a:lvl1pPr marL="0" indent="0">
-              <a:buNone/>
-              <a:defRPr sz="2400" b="1"/>
+            <a:lvl1pPr marL="0" indent="0" algn="ctr">
+              <a:buNone/>
+              <a:defRPr sz="2400" b="0">
+                <a:solidFill>
+                  <a:schemeClr val="tx2"/>
+                </a:solidFill>
+              </a:defRPr>
             </a:lvl1pPr>
             <a:lvl2pPr marL="457200" indent="0">
               <a:buNone/>
@@ -1481,7 +1798,7 @@
       </p:sp>
       <p:sp>
         <p:nvSpPr>
-          <p:cNvPr id="4" name="3 Marcador de contenido"/>
+          <p:cNvPr id="4" name="Content Placeholder 3"/>
           <p:cNvSpPr>
             <a:spLocks noGrp="1"/>
           </p:cNvSpPr>
@@ -1491,8 +1808,8 @@
         </p:nvSpPr>
         <p:spPr>
           <a:xfrm>
-            <a:off x="457200" y="2174875"/>
-            <a:ext cx="4040188" cy="3951288"/>
+            <a:off x="457200" y="2438399"/>
+            <a:ext cx="4040188" cy="3687763"/>
           </a:xfrm>
         </p:spPr>
         <p:txBody>
@@ -1560,13 +1877,13 @@
               <a:rPr lang="es-ES" smtClean="0"/>
               <a:t>Quinto nivel</a:t>
             </a:r>
-            <a:endParaRPr lang="es-ES"/>
-          </a:p>
-        </p:txBody>
-      </p:sp>
-      <p:sp>
-        <p:nvSpPr>
-          <p:cNvPr id="5" name="4 Marcador de texto"/>
+            <a:endParaRPr lang="en-US" dirty="0"/>
+          </a:p>
+        </p:txBody>
+      </p:sp>
+      <p:sp>
+        <p:nvSpPr>
+          <p:cNvPr id="5" name="Text Placeholder 4"/>
           <p:cNvSpPr>
             <a:spLocks noGrp="1"/>
           </p:cNvSpPr>
@@ -1576,16 +1893,20 @@
         </p:nvSpPr>
         <p:spPr>
           <a:xfrm>
-            <a:off x="4645025" y="1535113"/>
+            <a:off x="4645025" y="1722438"/>
             <a:ext cx="4041775" cy="639762"/>
           </a:xfrm>
         </p:spPr>
         <p:txBody>
           <a:bodyPr anchor="b"/>
           <a:lstStyle>
-            <a:lvl1pPr marL="0" indent="0">
-              <a:buNone/>
-              <a:defRPr sz="2400" b="1"/>
+            <a:lvl1pPr marL="0" indent="0" algn="ctr">
+              <a:buNone/>
+              <a:defRPr sz="2400" b="0">
+                <a:solidFill>
+                  <a:schemeClr val="tx2"/>
+                </a:solidFill>
+              </a:defRPr>
             </a:lvl1pPr>
             <a:lvl2pPr marL="457200" indent="0">
               <a:buNone/>
@@ -1631,7 +1952,7 @@
       </p:sp>
       <p:sp>
         <p:nvSpPr>
-          <p:cNvPr id="6" name="5 Marcador de contenido"/>
+          <p:cNvPr id="6" name="Content Placeholder 5"/>
           <p:cNvSpPr>
             <a:spLocks noGrp="1"/>
           </p:cNvSpPr>
@@ -1641,8 +1962,8 @@
         </p:nvSpPr>
         <p:spPr>
           <a:xfrm>
-            <a:off x="4645025" y="2174875"/>
-            <a:ext cx="4041775" cy="3951288"/>
+            <a:off x="4645025" y="2438399"/>
+            <a:ext cx="4041775" cy="3687763"/>
           </a:xfrm>
         </p:spPr>
         <p:txBody>
@@ -1710,13 +2031,13 @@
               <a:rPr lang="es-ES" smtClean="0"/>
               <a:t>Quinto nivel</a:t>
             </a:r>
-            <a:endParaRPr lang="es-ES"/>
-          </a:p>
-        </p:txBody>
-      </p:sp>
-      <p:sp>
-        <p:nvSpPr>
-          <p:cNvPr id="7" name="6 Marcador de fecha"/>
+            <a:endParaRPr lang="en-US" dirty="0"/>
+          </a:p>
+        </p:txBody>
+      </p:sp>
+      <p:sp>
+        <p:nvSpPr>
+          <p:cNvPr id="7" name="Date Placeholder 6"/>
           <p:cNvSpPr>
             <a:spLocks noGrp="1"/>
           </p:cNvSpPr>
@@ -1731,7 +2052,7 @@
           <a:p>
             <a:fld id="{7A847CFC-816F-41D0-AAC0-9BF4FEBC753E}" type="datetimeFigureOut">
               <a:rPr lang="es-ES" smtClean="0"/>
-              <a:t>06/10/2006</a:t>
+              <a:t>03/04/2024</a:t>
             </a:fld>
             <a:endParaRPr lang="es-ES"/>
           </a:p>
@@ -1739,7 +2060,7 @@
       </p:sp>
       <p:sp>
         <p:nvSpPr>
-          <p:cNvPr id="8" name="7 Marcador de pie de página"/>
+          <p:cNvPr id="8" name="Footer Placeholder 7"/>
           <p:cNvSpPr>
             <a:spLocks noGrp="1"/>
           </p:cNvSpPr>
@@ -1758,7 +2079,7 @@
       </p:sp>
       <p:sp>
         <p:nvSpPr>
-          <p:cNvPr id="9" name="8 Marcador de número de diapositiva"/>
+          <p:cNvPr id="9" name="Slide Number Placeholder 8"/>
           <p:cNvSpPr>
             <a:spLocks noGrp="1"/>
           </p:cNvSpPr>
@@ -1776,6 +2097,29 @@
               <a:t>‹Nº›</a:t>
             </a:fld>
             <a:endParaRPr lang="es-ES"/>
+          </a:p>
+        </p:txBody>
+      </p:sp>
+      <p:sp>
+        <p:nvSpPr>
+          <p:cNvPr id="10" name="Title 9"/>
+          <p:cNvSpPr>
+            <a:spLocks noGrp="1"/>
+          </p:cNvSpPr>
+          <p:nvPr>
+            <p:ph type="title"/>
+          </p:nvPr>
+        </p:nvSpPr>
+        <p:spPr/>
+        <p:txBody>
+          <a:bodyPr/>
+          <a:lstStyle/>
+          <a:p>
+            <a:r>
+              <a:rPr lang="es-ES" smtClean="0"/>
+              <a:t>Haga clic para modificar el estilo de título del patrón</a:t>
+            </a:r>
+            <a:endParaRPr lang="en-US"/>
           </a:p>
         </p:txBody>
       </p:sp>
@@ -1806,30 +2150,7 @@
       </p:grpSpPr>
       <p:sp>
         <p:nvSpPr>
-          <p:cNvPr id="2" name="1 Título"/>
-          <p:cNvSpPr>
-            <a:spLocks noGrp="1"/>
-          </p:cNvSpPr>
-          <p:nvPr>
-            <p:ph type="title"/>
-          </p:nvPr>
-        </p:nvSpPr>
-        <p:spPr/>
-        <p:txBody>
-          <a:bodyPr/>
-          <a:lstStyle/>
-          <a:p>
-            <a:r>
-              <a:rPr lang="es-ES" smtClean="0"/>
-              <a:t>Haga clic para modificar el estilo de título del patrón</a:t>
-            </a:r>
-            <a:endParaRPr lang="es-ES"/>
-          </a:p>
-        </p:txBody>
-      </p:sp>
-      <p:sp>
-        <p:nvSpPr>
-          <p:cNvPr id="3" name="2 Marcador de fecha"/>
+          <p:cNvPr id="3" name="Date Placeholder 2"/>
           <p:cNvSpPr>
             <a:spLocks noGrp="1"/>
           </p:cNvSpPr>
@@ -1844,7 +2165,7 @@
           <a:p>
             <a:fld id="{7A847CFC-816F-41D0-AAC0-9BF4FEBC753E}" type="datetimeFigureOut">
               <a:rPr lang="es-ES" smtClean="0"/>
-              <a:t>06/10/2006</a:t>
+              <a:t>03/04/2024</a:t>
             </a:fld>
             <a:endParaRPr lang="es-ES"/>
           </a:p>
@@ -1852,7 +2173,7 @@
       </p:sp>
       <p:sp>
         <p:nvSpPr>
-          <p:cNvPr id="4" name="3 Marcador de pie de página"/>
+          <p:cNvPr id="4" name="Footer Placeholder 3"/>
           <p:cNvSpPr>
             <a:spLocks noGrp="1"/>
           </p:cNvSpPr>
@@ -1871,7 +2192,7 @@
       </p:sp>
       <p:sp>
         <p:nvSpPr>
-          <p:cNvPr id="5" name="4 Marcador de número de diapositiva"/>
+          <p:cNvPr id="5" name="Slide Number Placeholder 4"/>
           <p:cNvSpPr>
             <a:spLocks noGrp="1"/>
           </p:cNvSpPr>
@@ -1889,6 +2210,29 @@
               <a:t>‹Nº›</a:t>
             </a:fld>
             <a:endParaRPr lang="es-ES"/>
+          </a:p>
+        </p:txBody>
+      </p:sp>
+      <p:sp>
+        <p:nvSpPr>
+          <p:cNvPr id="6" name="Title 5"/>
+          <p:cNvSpPr>
+            <a:spLocks noGrp="1"/>
+          </p:cNvSpPr>
+          <p:nvPr>
+            <p:ph type="title"/>
+          </p:nvPr>
+        </p:nvSpPr>
+        <p:spPr/>
+        <p:txBody>
+          <a:bodyPr/>
+          <a:lstStyle/>
+          <a:p>
+            <a:r>
+              <a:rPr lang="es-ES" smtClean="0"/>
+              <a:t>Haga clic para modificar el estilo de título del patrón</a:t>
+            </a:r>
+            <a:endParaRPr lang="en-US"/>
           </a:p>
         </p:txBody>
       </p:sp>
@@ -1901,7 +2245,7 @@
 </file>
 
 <file path=ppt/slideLayouts/slideLayout7.xml><?xml version="1.0" encoding="utf-8"?>
-<p:sldLayout xmlns:a="http://schemas.openxmlformats.org/drawingml/2006/main" xmlns:r="http://schemas.openxmlformats.org/officeDocument/2006/relationships" xmlns:p="http://schemas.openxmlformats.org/presentationml/2006/main" type="blank" preserve="1">
+<p:sldLayout xmlns:a="http://schemas.openxmlformats.org/drawingml/2006/main" xmlns:r="http://schemas.openxmlformats.org/officeDocument/2006/relationships" xmlns:p="http://schemas.openxmlformats.org/presentationml/2006/main" showMasterSp="0" type="blank" preserve="1">
   <p:cSld name="En blanco">
     <p:spTree>
       <p:nvGrpSpPr>
@@ -1919,7 +2263,53 @@
       </p:grpSpPr>
       <p:sp>
         <p:nvSpPr>
-          <p:cNvPr id="2" name="1 Marcador de fecha"/>
+          <p:cNvPr id="5" name="Rectangle 4"/>
+          <p:cNvSpPr/>
+          <p:nvPr/>
+        </p:nvSpPr>
+        <p:spPr>
+          <a:xfrm>
+            <a:off x="152400" y="150919"/>
+            <a:ext cx="8831802" cy="6556248"/>
+          </a:xfrm>
+          <a:prstGeom prst="rect">
+            <a:avLst/>
+          </a:prstGeom>
+          <a:solidFill>
+            <a:schemeClr val="bg2"/>
+          </a:solidFill>
+          <a:ln>
+            <a:noFill/>
+          </a:ln>
+        </p:spPr>
+        <p:style>
+          <a:lnRef idx="2">
+            <a:schemeClr val="accent1">
+              <a:shade val="50000"/>
+            </a:schemeClr>
+          </a:lnRef>
+          <a:fillRef idx="1">
+            <a:schemeClr val="accent1"/>
+          </a:fillRef>
+          <a:effectRef idx="0">
+            <a:schemeClr val="accent1"/>
+          </a:effectRef>
+          <a:fontRef idx="minor">
+            <a:schemeClr val="lt1"/>
+          </a:fontRef>
+        </p:style>
+        <p:txBody>
+          <a:bodyPr rtlCol="0" anchor="ctr"/>
+          <a:lstStyle/>
+          <a:p>
+            <a:pPr algn="ctr"/>
+            <a:endParaRPr lang="en-US"/>
+          </a:p>
+        </p:txBody>
+      </p:sp>
+      <p:sp>
+        <p:nvSpPr>
+          <p:cNvPr id="2" name="Date Placeholder 1"/>
           <p:cNvSpPr>
             <a:spLocks noGrp="1"/>
           </p:cNvSpPr>
@@ -1934,7 +2324,7 @@
           <a:p>
             <a:fld id="{7A847CFC-816F-41D0-AAC0-9BF4FEBC753E}" type="datetimeFigureOut">
               <a:rPr lang="es-ES" smtClean="0"/>
-              <a:t>06/10/2006</a:t>
+              <a:t>03/04/2024</a:t>
             </a:fld>
             <a:endParaRPr lang="es-ES"/>
           </a:p>
@@ -1942,7 +2332,7 @@
       </p:sp>
       <p:sp>
         <p:nvSpPr>
-          <p:cNvPr id="3" name="2 Marcador de pie de página"/>
+          <p:cNvPr id="3" name="Footer Placeholder 2"/>
           <p:cNvSpPr>
             <a:spLocks noGrp="1"/>
           </p:cNvSpPr>
@@ -1961,7 +2351,7 @@
       </p:sp>
       <p:sp>
         <p:nvSpPr>
-          <p:cNvPr id="4" name="3 Marcador de número de diapositiva"/>
+          <p:cNvPr id="4" name="Slide Number Placeholder 3"/>
           <p:cNvSpPr>
             <a:spLocks noGrp="1"/>
           </p:cNvSpPr>
@@ -1991,8 +2381,13 @@
 </file>
 
 <file path=ppt/slideLayouts/slideLayout8.xml><?xml version="1.0" encoding="utf-8"?>
-<p:sldLayout xmlns:a="http://schemas.openxmlformats.org/drawingml/2006/main" xmlns:r="http://schemas.openxmlformats.org/officeDocument/2006/relationships" xmlns:p="http://schemas.openxmlformats.org/presentationml/2006/main" type="objTx" preserve="1">
+<p:sldLayout xmlns:a="http://schemas.openxmlformats.org/drawingml/2006/main" xmlns:r="http://schemas.openxmlformats.org/officeDocument/2006/relationships" xmlns:p="http://schemas.openxmlformats.org/presentationml/2006/main" showMasterSp="0" type="objTx" preserve="1">
   <p:cSld name="Contenido con título">
+    <p:bg>
+      <p:bgRef idx="1001">
+        <a:schemeClr val="bg2"/>
+      </p:bgRef>
+    </p:bg>
     <p:spTree>
       <p:nvGrpSpPr>
         <p:cNvPr id="1" name=""/>
@@ -2009,50 +2404,153 @@
       </p:grpSpPr>
       <p:sp>
         <p:nvSpPr>
-          <p:cNvPr id="2" name="1 Título"/>
-          <p:cNvSpPr>
-            <a:spLocks noGrp="1"/>
-          </p:cNvSpPr>
-          <p:nvPr>
-            <p:ph type="title"/>
-          </p:nvPr>
+          <p:cNvPr id="10" name="Rectangle 9"/>
+          <p:cNvSpPr/>
+          <p:nvPr/>
         </p:nvSpPr>
         <p:spPr>
           <a:xfrm>
-            <a:off x="457200" y="273050"/>
-            <a:ext cx="3008313" cy="1162050"/>
+            <a:off x="0" y="0"/>
+            <a:ext cx="9144000" cy="6858000"/>
           </a:xfrm>
+          <a:prstGeom prst="rect">
+            <a:avLst/>
+          </a:prstGeom>
+          <a:solidFill>
+            <a:srgbClr val="FFFFFF"/>
+          </a:solidFill>
+          <a:ln>
+            <a:noFill/>
+          </a:ln>
         </p:spPr>
-        <p:txBody>
-          <a:bodyPr anchor="b"/>
-          <a:lstStyle>
-            <a:lvl1pPr algn="l">
-              <a:defRPr sz="2000" b="1"/>
-            </a:lvl1pPr>
-          </a:lstStyle>
-          <a:p>
-            <a:r>
-              <a:rPr lang="es-ES" smtClean="0"/>
-              <a:t>Haga clic para modificar el estilo de título del patrón</a:t>
-            </a:r>
-            <a:endParaRPr lang="es-ES"/>
-          </a:p>
-        </p:txBody>
-      </p:sp>
-      <p:sp>
-        <p:nvSpPr>
-          <p:cNvPr id="3" name="2 Marcador de contenido"/>
-          <p:cNvSpPr>
-            <a:spLocks noGrp="1"/>
-          </p:cNvSpPr>
-          <p:nvPr>
-            <p:ph idx="1"/>
-          </p:nvPr>
+        <p:style>
+          <a:lnRef idx="2">
+            <a:schemeClr val="accent1">
+              <a:shade val="50000"/>
+            </a:schemeClr>
+          </a:lnRef>
+          <a:fillRef idx="1">
+            <a:schemeClr val="accent1"/>
+          </a:fillRef>
+          <a:effectRef idx="0">
+            <a:schemeClr val="accent1"/>
+          </a:effectRef>
+          <a:fontRef idx="minor">
+            <a:schemeClr val="lt1"/>
+          </a:fontRef>
+        </p:style>
+        <p:txBody>
+          <a:bodyPr rtlCol="0" anchor="ctr"/>
+          <a:lstStyle/>
+          <a:p>
+            <a:pPr algn="ctr"/>
+            <a:endParaRPr lang="en-US"/>
+          </a:p>
+        </p:txBody>
+      </p:sp>
+      <p:sp>
+        <p:nvSpPr>
+          <p:cNvPr id="8" name="Rectangle 7"/>
+          <p:cNvSpPr/>
+          <p:nvPr/>
         </p:nvSpPr>
         <p:spPr>
           <a:xfrm>
-            <a:off x="3575050" y="273050"/>
-            <a:ext cx="5111750" cy="5853113"/>
+            <a:off x="7010400" y="150876"/>
+            <a:ext cx="1981200" cy="6556248"/>
+          </a:xfrm>
+          <a:prstGeom prst="rect">
+            <a:avLst/>
+          </a:prstGeom>
+          <a:solidFill>
+            <a:schemeClr val="accent1"/>
+          </a:solidFill>
+          <a:ln>
+            <a:noFill/>
+          </a:ln>
+        </p:spPr>
+        <p:style>
+          <a:lnRef idx="2">
+            <a:schemeClr val="accent1">
+              <a:shade val="50000"/>
+            </a:schemeClr>
+          </a:lnRef>
+          <a:fillRef idx="1">
+            <a:schemeClr val="accent1"/>
+          </a:fillRef>
+          <a:effectRef idx="0">
+            <a:schemeClr val="accent1"/>
+          </a:effectRef>
+          <a:fontRef idx="minor">
+            <a:schemeClr val="lt1"/>
+          </a:fontRef>
+        </p:style>
+        <p:txBody>
+          <a:bodyPr rtlCol="0" anchor="ctr"/>
+          <a:lstStyle/>
+          <a:p>
+            <a:pPr algn="ctr"/>
+            <a:endParaRPr lang="en-US"/>
+          </a:p>
+        </p:txBody>
+      </p:sp>
+      <p:sp useBgFill="1">
+        <p:nvSpPr>
+          <p:cNvPr id="9" name="Rectangle 8"/>
+          <p:cNvSpPr/>
+          <p:nvPr/>
+        </p:nvSpPr>
+        <p:spPr>
+          <a:xfrm>
+            <a:off x="152400" y="152400"/>
+            <a:ext cx="6705600" cy="6553200"/>
+          </a:xfrm>
+          <a:prstGeom prst="rect">
+            <a:avLst/>
+          </a:prstGeom>
+          <a:ln>
+            <a:noFill/>
+          </a:ln>
+        </p:spPr>
+        <p:style>
+          <a:lnRef idx="2">
+            <a:schemeClr val="accent1">
+              <a:shade val="50000"/>
+            </a:schemeClr>
+          </a:lnRef>
+          <a:fillRef idx="1">
+            <a:schemeClr val="accent1"/>
+          </a:fillRef>
+          <a:effectRef idx="0">
+            <a:schemeClr val="accent1"/>
+          </a:effectRef>
+          <a:fontRef idx="minor">
+            <a:schemeClr val="lt1"/>
+          </a:fontRef>
+        </p:style>
+        <p:txBody>
+          <a:bodyPr rtlCol="0" anchor="ctr"/>
+          <a:lstStyle/>
+          <a:p>
+            <a:pPr algn="ctr"/>
+            <a:endParaRPr lang="en-US"/>
+          </a:p>
+        </p:txBody>
+      </p:sp>
+      <p:sp>
+        <p:nvSpPr>
+          <p:cNvPr id="3" name="Content Placeholder 2"/>
+          <p:cNvSpPr>
+            <a:spLocks noGrp="1"/>
+          </p:cNvSpPr>
+          <p:nvPr>
+            <p:ph idx="1"/>
+          </p:nvPr>
+        </p:nvSpPr>
+        <p:spPr>
+          <a:xfrm>
+            <a:off x="609600" y="304800"/>
+            <a:ext cx="5867400" cy="5853113"/>
           </a:xfrm>
         </p:spPr>
         <p:txBody>
@@ -2120,13 +2618,13 @@
               <a:rPr lang="es-ES" smtClean="0"/>
               <a:t>Quinto nivel</a:t>
             </a:r>
-            <a:endParaRPr lang="es-ES"/>
-          </a:p>
-        </p:txBody>
-      </p:sp>
-      <p:sp>
-        <p:nvSpPr>
-          <p:cNvPr id="4" name="3 Marcador de texto"/>
+            <a:endParaRPr lang="en-US"/>
+          </a:p>
+        </p:txBody>
+      </p:sp>
+      <p:sp>
+        <p:nvSpPr>
+          <p:cNvPr id="4" name="Text Placeholder 3"/>
           <p:cNvSpPr>
             <a:spLocks noGrp="1"/>
           </p:cNvSpPr>
@@ -2136,16 +2634,20 @@
         </p:nvSpPr>
         <p:spPr>
           <a:xfrm>
-            <a:off x="457200" y="1435100"/>
-            <a:ext cx="3008313" cy="4691063"/>
+            <a:off x="7159752" y="2130552"/>
+            <a:ext cx="1673352" cy="2816352"/>
           </a:xfrm>
         </p:spPr>
         <p:txBody>
-          <a:bodyPr/>
+          <a:bodyPr tIns="0"/>
           <a:lstStyle>
             <a:lvl1pPr marL="0" indent="0">
               <a:buNone/>
-              <a:defRPr sz="1400"/>
+              <a:defRPr sz="1400">
+                <a:solidFill>
+                  <a:srgbClr val="FFFFFF"/>
+                </a:solidFill>
+              </a:defRPr>
             </a:lvl1pPr>
             <a:lvl2pPr marL="457200" indent="0">
               <a:buNone/>
@@ -2191,7 +2693,7 @@
       </p:sp>
       <p:sp>
         <p:nvSpPr>
-          <p:cNvPr id="5" name="4 Marcador de fecha"/>
+          <p:cNvPr id="5" name="Date Placeholder 4"/>
           <p:cNvSpPr>
             <a:spLocks noGrp="1"/>
           </p:cNvSpPr>
@@ -2206,7 +2708,7 @@
           <a:p>
             <a:fld id="{7A847CFC-816F-41D0-AAC0-9BF4FEBC753E}" type="datetimeFigureOut">
               <a:rPr lang="es-ES" smtClean="0"/>
-              <a:t>06/10/2006</a:t>
+              <a:t>03/04/2024</a:t>
             </a:fld>
             <a:endParaRPr lang="es-ES"/>
           </a:p>
@@ -2214,7 +2716,7 @@
       </p:sp>
       <p:sp>
         <p:nvSpPr>
-          <p:cNvPr id="6" name="5 Marcador de pie de página"/>
+          <p:cNvPr id="6" name="Footer Placeholder 5"/>
           <p:cNvSpPr>
             <a:spLocks noGrp="1"/>
           </p:cNvSpPr>
@@ -2233,7 +2735,7 @@
       </p:sp>
       <p:sp>
         <p:nvSpPr>
-          <p:cNvPr id="7" name="6 Marcador de número de diapositiva"/>
+          <p:cNvPr id="7" name="Slide Number Placeholder 6"/>
           <p:cNvSpPr>
             <a:spLocks noGrp="1"/>
           </p:cNvSpPr>
@@ -2241,10 +2743,22 @@
             <p:ph type="sldNum" sz="quarter" idx="12"/>
           </p:nvPr>
         </p:nvSpPr>
-        <p:spPr/>
-        <p:txBody>
-          <a:bodyPr/>
-          <a:lstStyle/>
+        <p:spPr>
+          <a:ln>
+            <a:noFill/>
+          </a:ln>
+        </p:spPr>
+        <p:txBody>
+          <a:bodyPr/>
+          <a:lstStyle>
+            <a:lvl1pPr>
+              <a:defRPr>
+                <a:solidFill>
+                  <a:srgbClr val="FFFFFF"/>
+                </a:solidFill>
+              </a:defRPr>
+            </a:lvl1pPr>
+          </a:lstStyle>
           <a:p>
             <a:fld id="{132FADFE-3B8F-471C-ABF0-DBC7717ECBBC}" type="slidenum">
               <a:rPr lang="es-ES" smtClean="0"/>
@@ -2254,17 +2768,54 @@
           </a:p>
         </p:txBody>
       </p:sp>
+      <p:sp>
+        <p:nvSpPr>
+          <p:cNvPr id="11" name="Title 10"/>
+          <p:cNvSpPr>
+            <a:spLocks noGrp="1"/>
+          </p:cNvSpPr>
+          <p:nvPr>
+            <p:ph type="title"/>
+          </p:nvPr>
+        </p:nvSpPr>
+        <p:spPr>
+          <a:xfrm>
+            <a:off x="7159752" y="457200"/>
+            <a:ext cx="1675660" cy="1673352"/>
+          </a:xfrm>
+        </p:spPr>
+        <p:txBody>
+          <a:bodyPr anchor="b"/>
+          <a:lstStyle>
+            <a:lvl1pPr algn="l">
+              <a:defRPr sz="2000" spc="150" baseline="0"/>
+            </a:lvl1pPr>
+          </a:lstStyle>
+          <a:p>
+            <a:r>
+              <a:rPr lang="es-ES" smtClean="0"/>
+              <a:t>Haga clic para modificar el estilo de título del patrón</a:t>
+            </a:r>
+            <a:endParaRPr lang="en-US" dirty="0"/>
+          </a:p>
+        </p:txBody>
+      </p:sp>
     </p:spTree>
   </p:cSld>
   <p:clrMapOvr>
-    <a:masterClrMapping/>
+    <a:overrideClrMapping bg1="lt1" tx1="dk1" bg2="lt2" tx2="dk2" accent1="accent1" accent2="accent2" accent3="accent3" accent4="accent4" accent5="accent5" accent6="accent6" hlink="hlink" folHlink="folHlink"/>
   </p:clrMapOvr>
 </p:sldLayout>
 </file>
 
 <file path=ppt/slideLayouts/slideLayout9.xml><?xml version="1.0" encoding="utf-8"?>
-<p:sldLayout xmlns:a="http://schemas.openxmlformats.org/drawingml/2006/main" xmlns:r="http://schemas.openxmlformats.org/officeDocument/2006/relationships" xmlns:p="http://schemas.openxmlformats.org/presentationml/2006/main" type="picTx" preserve="1">
+<p:sldLayout xmlns:a="http://schemas.openxmlformats.org/drawingml/2006/main" xmlns:r="http://schemas.openxmlformats.org/officeDocument/2006/relationships" xmlns:p="http://schemas.openxmlformats.org/presentationml/2006/main" showMasterSp="0" type="picTx" preserve="1">
   <p:cSld name="Imagen con título">
+    <p:bg>
+      <p:bgRef idx="1001">
+        <a:schemeClr val="bg2"/>
+      </p:bgRef>
+    </p:bg>
     <p:spTree>
       <p:nvGrpSpPr>
         <p:cNvPr id="1" name=""/>
@@ -2281,25 +2832,317 @@
       </p:grpSpPr>
       <p:sp>
         <p:nvSpPr>
-          <p:cNvPr id="2" name="1 Título"/>
-          <p:cNvSpPr>
-            <a:spLocks noGrp="1"/>
-          </p:cNvSpPr>
-          <p:nvPr>
-            <p:ph type="title"/>
-          </p:nvPr>
+          <p:cNvPr id="8" name="Rectangle 7"/>
+          <p:cNvSpPr/>
+          <p:nvPr/>
         </p:nvSpPr>
         <p:spPr>
           <a:xfrm>
-            <a:off x="1792288" y="4800600"/>
-            <a:ext cx="5486400" cy="566738"/>
+            <a:off x="0" y="0"/>
+            <a:ext cx="9144000" cy="6858000"/>
+          </a:xfrm>
+          <a:prstGeom prst="rect">
+            <a:avLst/>
+          </a:prstGeom>
+          <a:solidFill>
+            <a:srgbClr val="FFFFFF"/>
+          </a:solidFill>
+          <a:ln>
+            <a:noFill/>
+          </a:ln>
+        </p:spPr>
+        <p:style>
+          <a:lnRef idx="2">
+            <a:schemeClr val="accent1">
+              <a:shade val="50000"/>
+            </a:schemeClr>
+          </a:lnRef>
+          <a:fillRef idx="1">
+            <a:schemeClr val="accent1"/>
+          </a:fillRef>
+          <a:effectRef idx="0">
+            <a:schemeClr val="accent1"/>
+          </a:effectRef>
+          <a:fontRef idx="minor">
+            <a:schemeClr val="lt1"/>
+          </a:fontRef>
+        </p:style>
+        <p:txBody>
+          <a:bodyPr rtlCol="0" anchor="ctr"/>
+          <a:lstStyle/>
+          <a:p>
+            <a:pPr algn="ctr"/>
+            <a:endParaRPr lang="en-US"/>
+          </a:p>
+        </p:txBody>
+      </p:sp>
+      <p:sp useBgFill="1">
+        <p:nvSpPr>
+          <p:cNvPr id="9" name="Rectangle 8"/>
+          <p:cNvSpPr/>
+          <p:nvPr/>
+        </p:nvSpPr>
+        <p:spPr>
+          <a:xfrm>
+            <a:off x="7010400" y="150876"/>
+            <a:ext cx="1981200" cy="6556248"/>
+          </a:xfrm>
+          <a:prstGeom prst="rect">
+            <a:avLst/>
+          </a:prstGeom>
+          <a:ln>
+            <a:noFill/>
+          </a:ln>
+        </p:spPr>
+        <p:style>
+          <a:lnRef idx="2">
+            <a:schemeClr val="accent1">
+              <a:shade val="50000"/>
+            </a:schemeClr>
+          </a:lnRef>
+          <a:fillRef idx="1">
+            <a:schemeClr val="accent1"/>
+          </a:fillRef>
+          <a:effectRef idx="0">
+            <a:schemeClr val="accent1"/>
+          </a:effectRef>
+          <a:fontRef idx="minor">
+            <a:schemeClr val="lt1"/>
+          </a:fontRef>
+        </p:style>
+        <p:txBody>
+          <a:bodyPr rtlCol="0" anchor="ctr"/>
+          <a:lstStyle/>
+          <a:p>
+            <a:pPr algn="ctr"/>
+            <a:endParaRPr lang="en-US"/>
+          </a:p>
+        </p:txBody>
+      </p:sp>
+      <p:sp>
+        <p:nvSpPr>
+          <p:cNvPr id="3" name="Picture Placeholder 2"/>
+          <p:cNvSpPr>
+            <a:spLocks noGrp="1"/>
+          </p:cNvSpPr>
+          <p:nvPr>
+            <p:ph type="pic" idx="1"/>
+          </p:nvPr>
+        </p:nvSpPr>
+        <p:spPr>
+          <a:xfrm>
+            <a:off x="152400" y="152400"/>
+            <a:ext cx="6705600" cy="6553200"/>
+          </a:xfrm>
+        </p:spPr>
+        <p:txBody>
+          <a:bodyPr anchor="ctr"/>
+          <a:lstStyle>
+            <a:lvl1pPr marL="0" indent="0" algn="ctr">
+              <a:buNone/>
+              <a:defRPr sz="3200"/>
+            </a:lvl1pPr>
+            <a:lvl2pPr marL="457200" indent="0">
+              <a:buNone/>
+              <a:defRPr sz="2800"/>
+            </a:lvl2pPr>
+            <a:lvl3pPr marL="914400" indent="0">
+              <a:buNone/>
+              <a:defRPr sz="2400"/>
+            </a:lvl3pPr>
+            <a:lvl4pPr marL="1371600" indent="0">
+              <a:buNone/>
+              <a:defRPr sz="2000"/>
+            </a:lvl4pPr>
+            <a:lvl5pPr marL="1828800" indent="0">
+              <a:buNone/>
+              <a:defRPr sz="2000"/>
+            </a:lvl5pPr>
+            <a:lvl6pPr marL="2286000" indent="0">
+              <a:buNone/>
+              <a:defRPr sz="2000"/>
+            </a:lvl6pPr>
+            <a:lvl7pPr marL="2743200" indent="0">
+              <a:buNone/>
+              <a:defRPr sz="2000"/>
+            </a:lvl7pPr>
+            <a:lvl8pPr marL="3200400" indent="0">
+              <a:buNone/>
+              <a:defRPr sz="2000"/>
+            </a:lvl8pPr>
+            <a:lvl9pPr marL="3657600" indent="0">
+              <a:buNone/>
+              <a:defRPr sz="2000"/>
+            </a:lvl9pPr>
+          </a:lstStyle>
+          <a:p>
+            <a:r>
+              <a:rPr lang="es-ES" smtClean="0"/>
+              <a:t>Haga clic en el icono para agregar una imagen</a:t>
+            </a:r>
+            <a:endParaRPr lang="en-US" dirty="0"/>
+          </a:p>
+        </p:txBody>
+      </p:sp>
+      <p:sp>
+        <p:nvSpPr>
+          <p:cNvPr id="4" name="Text Placeholder 3"/>
+          <p:cNvSpPr>
+            <a:spLocks noGrp="1"/>
+          </p:cNvSpPr>
+          <p:nvPr>
+            <p:ph type="body" sz="half" idx="2"/>
+          </p:nvPr>
+        </p:nvSpPr>
+        <p:spPr>
+          <a:xfrm>
+            <a:off x="7162800" y="2133600"/>
+            <a:ext cx="1676400" cy="2971800"/>
+          </a:xfrm>
+        </p:spPr>
+        <p:txBody>
+          <a:bodyPr tIns="0"/>
+          <a:lstStyle>
+            <a:lvl1pPr marL="0" indent="0">
+              <a:buNone/>
+              <a:defRPr sz="1400">
+                <a:solidFill>
+                  <a:schemeClr val="tx1"/>
+                </a:solidFill>
+              </a:defRPr>
+            </a:lvl1pPr>
+            <a:lvl2pPr marL="457200" indent="0">
+              <a:buNone/>
+              <a:defRPr sz="1200"/>
+            </a:lvl2pPr>
+            <a:lvl3pPr marL="914400" indent="0">
+              <a:buNone/>
+              <a:defRPr sz="1000"/>
+            </a:lvl3pPr>
+            <a:lvl4pPr marL="1371600" indent="0">
+              <a:buNone/>
+              <a:defRPr sz="900"/>
+            </a:lvl4pPr>
+            <a:lvl5pPr marL="1828800" indent="0">
+              <a:buNone/>
+              <a:defRPr sz="900"/>
+            </a:lvl5pPr>
+            <a:lvl6pPr marL="2286000" indent="0">
+              <a:buNone/>
+              <a:defRPr sz="900"/>
+            </a:lvl6pPr>
+            <a:lvl7pPr marL="2743200" indent="0">
+              <a:buNone/>
+              <a:defRPr sz="900"/>
+            </a:lvl7pPr>
+            <a:lvl8pPr marL="3200400" indent="0">
+              <a:buNone/>
+              <a:defRPr sz="900"/>
+            </a:lvl8pPr>
+            <a:lvl9pPr marL="3657600" indent="0">
+              <a:buNone/>
+              <a:defRPr sz="900"/>
+            </a:lvl9pPr>
+          </a:lstStyle>
+          <a:p>
+            <a:pPr lvl="0"/>
+            <a:r>
+              <a:rPr lang="es-ES" smtClean="0"/>
+              <a:t>Haga clic para modificar el estilo de texto del patrón</a:t>
+            </a:r>
+          </a:p>
+        </p:txBody>
+      </p:sp>
+      <p:sp>
+        <p:nvSpPr>
+          <p:cNvPr id="5" name="Date Placeholder 4"/>
+          <p:cNvSpPr>
+            <a:spLocks noGrp="1"/>
+          </p:cNvSpPr>
+          <p:nvPr>
+            <p:ph type="dt" sz="half" idx="10"/>
+          </p:nvPr>
+        </p:nvSpPr>
+        <p:spPr/>
+        <p:txBody>
+          <a:bodyPr/>
+          <a:lstStyle/>
+          <a:p>
+            <a:fld id="{7A847CFC-816F-41D0-AAC0-9BF4FEBC753E}" type="datetimeFigureOut">
+              <a:rPr lang="es-ES" smtClean="0"/>
+              <a:t>03/04/2024</a:t>
+            </a:fld>
+            <a:endParaRPr lang="es-ES"/>
+          </a:p>
+        </p:txBody>
+      </p:sp>
+      <p:sp>
+        <p:nvSpPr>
+          <p:cNvPr id="6" name="Footer Placeholder 5"/>
+          <p:cNvSpPr>
+            <a:spLocks noGrp="1"/>
+          </p:cNvSpPr>
+          <p:nvPr>
+            <p:ph type="ftr" sz="quarter" idx="11"/>
+          </p:nvPr>
+        </p:nvSpPr>
+        <p:spPr/>
+        <p:txBody>
+          <a:bodyPr/>
+          <a:lstStyle/>
+          <a:p>
+            <a:endParaRPr lang="es-ES"/>
+          </a:p>
+        </p:txBody>
+      </p:sp>
+      <p:sp>
+        <p:nvSpPr>
+          <p:cNvPr id="7" name="Slide Number Placeholder 6"/>
+          <p:cNvSpPr>
+            <a:spLocks noGrp="1"/>
+          </p:cNvSpPr>
+          <p:nvPr>
+            <p:ph type="sldNum" sz="quarter" idx="12"/>
+          </p:nvPr>
+        </p:nvSpPr>
+        <p:spPr/>
+        <p:txBody>
+          <a:bodyPr/>
+          <a:lstStyle/>
+          <a:p>
+            <a:fld id="{132FADFE-3B8F-471C-ABF0-DBC7717ECBBC}" type="slidenum">
+              <a:rPr lang="es-ES" smtClean="0"/>
+              <a:t>‹Nº›</a:t>
+            </a:fld>
+            <a:endParaRPr lang="es-ES"/>
+          </a:p>
+        </p:txBody>
+      </p:sp>
+      <p:sp>
+        <p:nvSpPr>
+          <p:cNvPr id="10" name="Title 9"/>
+          <p:cNvSpPr>
+            <a:spLocks noGrp="1"/>
+          </p:cNvSpPr>
+          <p:nvPr>
+            <p:ph type="title"/>
+          </p:nvPr>
+        </p:nvSpPr>
+        <p:spPr>
+          <a:xfrm>
+            <a:off x="7162800" y="460248"/>
+            <a:ext cx="1676400" cy="1673352"/>
           </a:xfrm>
         </p:spPr>
         <p:txBody>
           <a:bodyPr anchor="b"/>
           <a:lstStyle>
             <a:lvl1pPr algn="l">
-              <a:defRPr sz="2000" b="1"/>
+              <a:defRPr sz="2000" spc="150" baseline="0">
+                <a:solidFill>
+                  <a:schemeClr val="tx2"/>
+                </a:solidFill>
+              </a:defRPr>
             </a:lvl1pPr>
           </a:lstStyle>
           <a:p>
@@ -2307,205 +3150,14 @@
               <a:rPr lang="es-ES" smtClean="0"/>
               <a:t>Haga clic para modificar el estilo de título del patrón</a:t>
             </a:r>
-            <a:endParaRPr lang="es-ES"/>
-          </a:p>
-        </p:txBody>
-      </p:sp>
-      <p:sp>
-        <p:nvSpPr>
-          <p:cNvPr id="3" name="2 Marcador de posición de imagen"/>
-          <p:cNvSpPr>
-            <a:spLocks noGrp="1"/>
-          </p:cNvSpPr>
-          <p:nvPr>
-            <p:ph type="pic" idx="1"/>
-          </p:nvPr>
-        </p:nvSpPr>
-        <p:spPr>
-          <a:xfrm>
-            <a:off x="1792288" y="612775"/>
-            <a:ext cx="5486400" cy="4114800"/>
-          </a:xfrm>
-        </p:spPr>
-        <p:txBody>
-          <a:bodyPr/>
-          <a:lstStyle>
-            <a:lvl1pPr marL="0" indent="0">
-              <a:buNone/>
-              <a:defRPr sz="3200"/>
-            </a:lvl1pPr>
-            <a:lvl2pPr marL="457200" indent="0">
-              <a:buNone/>
-              <a:defRPr sz="2800"/>
-            </a:lvl2pPr>
-            <a:lvl3pPr marL="914400" indent="0">
-              <a:buNone/>
-              <a:defRPr sz="2400"/>
-            </a:lvl3pPr>
-            <a:lvl4pPr marL="1371600" indent="0">
-              <a:buNone/>
-              <a:defRPr sz="2000"/>
-            </a:lvl4pPr>
-            <a:lvl5pPr marL="1828800" indent="0">
-              <a:buNone/>
-              <a:defRPr sz="2000"/>
-            </a:lvl5pPr>
-            <a:lvl6pPr marL="2286000" indent="0">
-              <a:buNone/>
-              <a:defRPr sz="2000"/>
-            </a:lvl6pPr>
-            <a:lvl7pPr marL="2743200" indent="0">
-              <a:buNone/>
-              <a:defRPr sz="2000"/>
-            </a:lvl7pPr>
-            <a:lvl8pPr marL="3200400" indent="0">
-              <a:buNone/>
-              <a:defRPr sz="2000"/>
-            </a:lvl8pPr>
-            <a:lvl9pPr marL="3657600" indent="0">
-              <a:buNone/>
-              <a:defRPr sz="2000"/>
-            </a:lvl9pPr>
-          </a:lstStyle>
-          <a:p>
-            <a:endParaRPr lang="es-ES"/>
-          </a:p>
-        </p:txBody>
-      </p:sp>
-      <p:sp>
-        <p:nvSpPr>
-          <p:cNvPr id="4" name="3 Marcador de texto"/>
-          <p:cNvSpPr>
-            <a:spLocks noGrp="1"/>
-          </p:cNvSpPr>
-          <p:nvPr>
-            <p:ph type="body" sz="half" idx="2"/>
-          </p:nvPr>
-        </p:nvSpPr>
-        <p:spPr>
-          <a:xfrm>
-            <a:off x="1792288" y="5367338"/>
-            <a:ext cx="5486400" cy="804862"/>
-          </a:xfrm>
-        </p:spPr>
-        <p:txBody>
-          <a:bodyPr/>
-          <a:lstStyle>
-            <a:lvl1pPr marL="0" indent="0">
-              <a:buNone/>
-              <a:defRPr sz="1400"/>
-            </a:lvl1pPr>
-            <a:lvl2pPr marL="457200" indent="0">
-              <a:buNone/>
-              <a:defRPr sz="1200"/>
-            </a:lvl2pPr>
-            <a:lvl3pPr marL="914400" indent="0">
-              <a:buNone/>
-              <a:defRPr sz="1000"/>
-            </a:lvl3pPr>
-            <a:lvl4pPr marL="1371600" indent="0">
-              <a:buNone/>
-              <a:defRPr sz="900"/>
-            </a:lvl4pPr>
-            <a:lvl5pPr marL="1828800" indent="0">
-              <a:buNone/>
-              <a:defRPr sz="900"/>
-            </a:lvl5pPr>
-            <a:lvl6pPr marL="2286000" indent="0">
-              <a:buNone/>
-              <a:defRPr sz="900"/>
-            </a:lvl6pPr>
-            <a:lvl7pPr marL="2743200" indent="0">
-              <a:buNone/>
-              <a:defRPr sz="900"/>
-            </a:lvl7pPr>
-            <a:lvl8pPr marL="3200400" indent="0">
-              <a:buNone/>
-              <a:defRPr sz="900"/>
-            </a:lvl8pPr>
-            <a:lvl9pPr marL="3657600" indent="0">
-              <a:buNone/>
-              <a:defRPr sz="900"/>
-            </a:lvl9pPr>
-          </a:lstStyle>
-          <a:p>
-            <a:pPr lvl="0"/>
-            <a:r>
-              <a:rPr lang="es-ES" smtClean="0"/>
-              <a:t>Haga clic para modificar el estilo de texto del patrón</a:t>
-            </a:r>
-          </a:p>
-        </p:txBody>
-      </p:sp>
-      <p:sp>
-        <p:nvSpPr>
-          <p:cNvPr id="5" name="4 Marcador de fecha"/>
-          <p:cNvSpPr>
-            <a:spLocks noGrp="1"/>
-          </p:cNvSpPr>
-          <p:nvPr>
-            <p:ph type="dt" sz="half" idx="10"/>
-          </p:nvPr>
-        </p:nvSpPr>
-        <p:spPr/>
-        <p:txBody>
-          <a:bodyPr/>
-          <a:lstStyle/>
-          <a:p>
-            <a:fld id="{7A847CFC-816F-41D0-AAC0-9BF4FEBC753E}" type="datetimeFigureOut">
-              <a:rPr lang="es-ES" smtClean="0"/>
-              <a:t>06/10/2006</a:t>
-            </a:fld>
-            <a:endParaRPr lang="es-ES"/>
-          </a:p>
-        </p:txBody>
-      </p:sp>
-      <p:sp>
-        <p:nvSpPr>
-          <p:cNvPr id="6" name="5 Marcador de pie de página"/>
-          <p:cNvSpPr>
-            <a:spLocks noGrp="1"/>
-          </p:cNvSpPr>
-          <p:nvPr>
-            <p:ph type="ftr" sz="quarter" idx="11"/>
-          </p:nvPr>
-        </p:nvSpPr>
-        <p:spPr/>
-        <p:txBody>
-          <a:bodyPr/>
-          <a:lstStyle/>
-          <a:p>
-            <a:endParaRPr lang="es-ES"/>
-          </a:p>
-        </p:txBody>
-      </p:sp>
-      <p:sp>
-        <p:nvSpPr>
-          <p:cNvPr id="7" name="6 Marcador de número de diapositiva"/>
-          <p:cNvSpPr>
-            <a:spLocks noGrp="1"/>
-          </p:cNvSpPr>
-          <p:nvPr>
-            <p:ph type="sldNum" sz="quarter" idx="12"/>
-          </p:nvPr>
-        </p:nvSpPr>
-        <p:spPr/>
-        <p:txBody>
-          <a:bodyPr/>
-          <a:lstStyle/>
-          <a:p>
-            <a:fld id="{132FADFE-3B8F-471C-ABF0-DBC7717ECBBC}" type="slidenum">
-              <a:rPr lang="es-ES" smtClean="0"/>
-              <a:t>‹Nº›</a:t>
-            </a:fld>
-            <a:endParaRPr lang="es-ES"/>
+            <a:endParaRPr lang="en-US" dirty="0"/>
           </a:p>
         </p:txBody>
       </p:sp>
     </p:spTree>
   </p:cSld>
   <p:clrMapOvr>
-    <a:masterClrMapping/>
+    <a:overrideClrMapping bg1="dk1" tx1="lt1" bg2="dk2" tx2="lt2" accent1="accent1" accent2="accent2" accent3="accent3" accent4="accent4" accent5="accent5" accent6="accent6" hlink="hlink" folHlink="folHlink"/>
   </p:clrMapOvr>
 </p:sldLayout>
 </file>
@@ -2534,18 +3186,110 @@
       </p:grpSpPr>
       <p:sp>
         <p:nvSpPr>
-          <p:cNvPr id="2" name="1 Marcador de título"/>
-          <p:cNvSpPr>
-            <a:spLocks noGrp="1"/>
-          </p:cNvSpPr>
-          <p:nvPr>
-            <p:ph type="title"/>
-          </p:nvPr>
+          <p:cNvPr id="9" name="Rectangle 8"/>
+          <p:cNvSpPr/>
+          <p:nvPr/>
         </p:nvSpPr>
         <p:spPr>
           <a:xfrm>
-            <a:off x="457200" y="274638"/>
-            <a:ext cx="8229600" cy="1143000"/>
+            <a:off x="152400" y="1634971"/>
+            <a:ext cx="8831802" cy="5045476"/>
+          </a:xfrm>
+          <a:prstGeom prst="rect">
+            <a:avLst/>
+          </a:prstGeom>
+          <a:solidFill>
+            <a:schemeClr val="bg2"/>
+          </a:solidFill>
+          <a:ln>
+            <a:noFill/>
+          </a:ln>
+        </p:spPr>
+        <p:style>
+          <a:lnRef idx="2">
+            <a:schemeClr val="accent1">
+              <a:shade val="50000"/>
+            </a:schemeClr>
+          </a:lnRef>
+          <a:fillRef idx="1">
+            <a:schemeClr val="accent1"/>
+          </a:fillRef>
+          <a:effectRef idx="0">
+            <a:schemeClr val="accent1"/>
+          </a:effectRef>
+          <a:fontRef idx="minor">
+            <a:schemeClr val="lt1"/>
+          </a:fontRef>
+        </p:style>
+        <p:txBody>
+          <a:bodyPr rtlCol="0" anchor="ctr"/>
+          <a:lstStyle/>
+          <a:p>
+            <a:pPr algn="ctr"/>
+            <a:endParaRPr lang="en-US"/>
+          </a:p>
+        </p:txBody>
+      </p:sp>
+      <p:sp>
+        <p:nvSpPr>
+          <p:cNvPr id="8" name="Rectangle 7"/>
+          <p:cNvSpPr/>
+          <p:nvPr/>
+        </p:nvSpPr>
+        <p:spPr>
+          <a:xfrm>
+            <a:off x="152399" y="152400"/>
+            <a:ext cx="8814047" cy="1346447"/>
+          </a:xfrm>
+          <a:prstGeom prst="rect">
+            <a:avLst/>
+          </a:prstGeom>
+          <a:solidFill>
+            <a:schemeClr val="tx2"/>
+          </a:solidFill>
+          <a:ln>
+            <a:noFill/>
+          </a:ln>
+        </p:spPr>
+        <p:style>
+          <a:lnRef idx="2">
+            <a:schemeClr val="accent1">
+              <a:shade val="50000"/>
+            </a:schemeClr>
+          </a:lnRef>
+          <a:fillRef idx="1">
+            <a:schemeClr val="accent1"/>
+          </a:fillRef>
+          <a:effectRef idx="0">
+            <a:schemeClr val="accent1"/>
+          </a:effectRef>
+          <a:fontRef idx="minor">
+            <a:schemeClr val="lt1"/>
+          </a:fontRef>
+        </p:style>
+        <p:txBody>
+          <a:bodyPr rtlCol="0" anchor="ctr"/>
+          <a:lstStyle/>
+          <a:p>
+            <a:pPr algn="ctr"/>
+            <a:endParaRPr lang="en-US"/>
+          </a:p>
+        </p:txBody>
+      </p:sp>
+      <p:sp>
+        <p:nvSpPr>
+          <p:cNvPr id="2" name="Title Placeholder 1"/>
+          <p:cNvSpPr>
+            <a:spLocks noGrp="1"/>
+          </p:cNvSpPr>
+          <p:nvPr>
+            <p:ph type="title"/>
+          </p:nvPr>
+        </p:nvSpPr>
+        <p:spPr>
+          <a:xfrm>
+            <a:off x="381000" y="355847"/>
+            <a:ext cx="8381260" cy="1054394"/>
           </a:xfrm>
           <a:prstGeom prst="rect">
             <a:avLst/>
@@ -2553,7 +3297,7 @@
         </p:spPr>
         <p:txBody>
           <a:bodyPr vert="horz" lIns="91440" tIns="45720" rIns="91440" bIns="45720" rtlCol="0" anchor="ctr">
-            <a:normAutofit/>
+            <a:noAutofit/>
           </a:bodyPr>
           <a:lstStyle/>
           <a:p>
@@ -2561,13 +3305,13 @@
               <a:rPr lang="es-ES" smtClean="0"/>
               <a:t>Haga clic para modificar el estilo de título del patrón</a:t>
             </a:r>
-            <a:endParaRPr lang="es-ES"/>
-          </a:p>
-        </p:txBody>
-      </p:sp>
-      <p:sp>
-        <p:nvSpPr>
-          <p:cNvPr id="3" name="2 Marcador de texto"/>
+            <a:endParaRPr lang="en-US" dirty="0"/>
+          </a:p>
+        </p:txBody>
+      </p:sp>
+      <p:sp>
+        <p:nvSpPr>
+          <p:cNvPr id="3" name="Text Placeholder 2"/>
           <p:cNvSpPr>
             <a:spLocks noGrp="1"/>
           </p:cNvSpPr>
@@ -2577,8 +3321,8 @@
         </p:nvSpPr>
         <p:spPr>
           <a:xfrm>
-            <a:off x="457200" y="1600200"/>
-            <a:ext cx="8229600" cy="4525963"/>
+            <a:off x="380999" y="1719071"/>
+            <a:ext cx="8407893" cy="4407408"/>
           </a:xfrm>
           <a:prstGeom prst="rect">
             <a:avLst/>
@@ -2623,13 +3367,13 @@
               <a:rPr lang="es-ES" smtClean="0"/>
               <a:t>Quinto nivel</a:t>
             </a:r>
-            <a:endParaRPr lang="es-ES"/>
-          </a:p>
-        </p:txBody>
-      </p:sp>
-      <p:sp>
-        <p:nvSpPr>
-          <p:cNvPr id="4" name="3 Marcador de fecha"/>
+            <a:endParaRPr lang="en-US" dirty="0"/>
+          </a:p>
+        </p:txBody>
+      </p:sp>
+      <p:sp>
+        <p:nvSpPr>
+          <p:cNvPr id="4" name="Date Placeholder 3"/>
           <p:cNvSpPr>
             <a:spLocks noGrp="1"/>
           </p:cNvSpPr>
@@ -2639,8 +3383,8 @@
         </p:nvSpPr>
         <p:spPr>
           <a:xfrm>
-            <a:off x="457200" y="6356350"/>
-            <a:ext cx="2133600" cy="365125"/>
+            <a:off x="370888" y="6356350"/>
+            <a:ext cx="2133600" cy="274320"/>
           </a:xfrm>
           <a:prstGeom prst="rect">
             <a:avLst/>
@@ -2650,11 +3394,9 @@
           <a:bodyPr vert="horz" lIns="91440" tIns="45720" rIns="91440" bIns="45720" rtlCol="0" anchor="ctr"/>
           <a:lstStyle>
             <a:lvl1pPr algn="l">
-              <a:defRPr sz="1200">
+              <a:defRPr sz="1100">
                 <a:solidFill>
-                  <a:schemeClr val="tx1">
-                    <a:tint val="75000"/>
-                  </a:schemeClr>
+                  <a:schemeClr val="tx2"/>
                 </a:solidFill>
               </a:defRPr>
             </a:lvl1pPr>
@@ -2662,7 +3404,7 @@
           <a:p>
             <a:fld id="{7A847CFC-816F-41D0-AAC0-9BF4FEBC753E}" type="datetimeFigureOut">
               <a:rPr lang="es-ES" smtClean="0"/>
-              <a:t>06/10/2006</a:t>
+              <a:t>03/04/2024</a:t>
             </a:fld>
             <a:endParaRPr lang="es-ES"/>
           </a:p>
@@ -2670,7 +3412,7 @@
       </p:sp>
       <p:sp>
         <p:nvSpPr>
-          <p:cNvPr id="5" name="4 Marcador de pie de página"/>
+          <p:cNvPr id="5" name="Footer Placeholder 4"/>
           <p:cNvSpPr>
             <a:spLocks noGrp="1"/>
           </p:cNvSpPr>
@@ -2680,8 +3422,8 @@
         </p:nvSpPr>
         <p:spPr>
           <a:xfrm>
-            <a:off x="3124200" y="6356350"/>
-            <a:ext cx="2895600" cy="365125"/>
+            <a:off x="3048000" y="6356350"/>
+            <a:ext cx="3352800" cy="274320"/>
           </a:xfrm>
           <a:prstGeom prst="rect">
             <a:avLst/>
@@ -2691,11 +3433,9 @@
           <a:bodyPr vert="horz" lIns="91440" tIns="45720" rIns="91440" bIns="45720" rtlCol="0" anchor="ctr"/>
           <a:lstStyle>
             <a:lvl1pPr algn="ctr">
-              <a:defRPr sz="1200">
+              <a:defRPr sz="1100">
                 <a:solidFill>
-                  <a:schemeClr val="tx1">
-                    <a:tint val="75000"/>
-                  </a:schemeClr>
+                  <a:schemeClr val="tx2"/>
                 </a:solidFill>
               </a:defRPr>
             </a:lvl1pPr>
@@ -2707,7 +3447,7 @@
       </p:sp>
       <p:sp>
         <p:nvSpPr>
-          <p:cNvPr id="6" name="5 Marcador de número de diapositiva"/>
+          <p:cNvPr id="6" name="Slide Number Placeholder 5"/>
           <p:cNvSpPr>
             <a:spLocks noGrp="1"/>
           </p:cNvSpPr>
@@ -2717,22 +3457,23 @@
         </p:nvSpPr>
         <p:spPr>
           <a:xfrm>
-            <a:off x="6553200" y="6356350"/>
-            <a:ext cx="2133600" cy="365125"/>
+            <a:off x="8234680" y="6355080"/>
+            <a:ext cx="582966" cy="274320"/>
           </a:xfrm>
           <a:prstGeom prst="rect">
             <a:avLst/>
           </a:prstGeom>
+          <a:ln w="19050">
+            <a:noFill/>
+          </a:ln>
         </p:spPr>
         <p:txBody>
           <a:bodyPr vert="horz" lIns="91440" tIns="45720" rIns="91440" bIns="45720" rtlCol="0" anchor="ctr"/>
           <a:lstStyle>
-            <a:lvl1pPr algn="r">
-              <a:defRPr sz="1200">
+            <a:lvl1pPr algn="ctr">
+              <a:defRPr sz="1100">
                 <a:solidFill>
-                  <a:schemeClr val="tx1">
-                    <a:tint val="75000"/>
-                  </a:schemeClr>
+                  <a:schemeClr val="tx2"/>
                 </a:solidFill>
               </a:defRPr>
             </a:lvl1pPr>
@@ -2750,17 +3491,17 @@
   </p:cSld>
   <p:clrMap bg1="lt1" tx1="dk1" bg2="lt2" tx2="dk2" accent1="accent1" accent2="accent2" accent3="accent3" accent4="accent4" accent5="accent5" accent6="accent6" hlink="hlink" folHlink="folHlink"/>
   <p:sldLayoutIdLst>
-    <p:sldLayoutId id="2147483649" r:id="rId1"/>
-    <p:sldLayoutId id="2147483650" r:id="rId2"/>
-    <p:sldLayoutId id="2147483651" r:id="rId3"/>
-    <p:sldLayoutId id="2147483652" r:id="rId4"/>
-    <p:sldLayoutId id="2147483653" r:id="rId5"/>
-    <p:sldLayoutId id="2147483654" r:id="rId6"/>
-    <p:sldLayoutId id="2147483655" r:id="rId7"/>
-    <p:sldLayoutId id="2147483656" r:id="rId8"/>
-    <p:sldLayoutId id="2147483657" r:id="rId9"/>
-    <p:sldLayoutId id="2147483658" r:id="rId10"/>
-    <p:sldLayoutId id="2147483659" r:id="rId11"/>
+    <p:sldLayoutId id="2147483733" r:id="rId1"/>
+    <p:sldLayoutId id="2147483734" r:id="rId2"/>
+    <p:sldLayoutId id="2147483735" r:id="rId3"/>
+    <p:sldLayoutId id="2147483736" r:id="rId4"/>
+    <p:sldLayoutId id="2147483737" r:id="rId5"/>
+    <p:sldLayoutId id="2147483738" r:id="rId6"/>
+    <p:sldLayoutId id="2147483739" r:id="rId7"/>
+    <p:sldLayoutId id="2147483740" r:id="rId8"/>
+    <p:sldLayoutId id="2147483741" r:id="rId9"/>
+    <p:sldLayoutId id="2147483742" r:id="rId10"/>
+    <p:sldLayoutId id="2147483743" r:id="rId11"/>
   </p:sldLayoutIdLst>
   <p:txStyles>
     <p:titleStyle>
@@ -2769,10 +3510,14 @@
           <a:spcPct val="0"/>
         </a:spcBef>
         <a:buNone/>
-        <a:defRPr sz="4400" kern="1200">
+        <a:defRPr sz="3200" kern="1200" cap="all" spc="200" baseline="0">
+          <a:ln>
+            <a:noFill/>
+          </a:ln>
           <a:solidFill>
-            <a:schemeClr val="tx1"/>
+            <a:schemeClr val="bg1"/>
           </a:solidFill>
+          <a:effectLst/>
           <a:latin typeface="+mj-lt"/>
           <a:ea typeface="+mj-ea"/>
           <a:cs typeface="+mj-cs"/>
@@ -2780,135 +3525,162 @@
       </a:lvl1pPr>
     </p:titleStyle>
     <p:bodyStyle>
-      <a:lvl1pPr marL="342900" indent="-342900" algn="l" defTabSz="914400" rtl="0" eaLnBrk="1" latinLnBrk="0" hangingPunct="1">
+      <a:lvl1pPr marL="274320" indent="-228600" algn="l" defTabSz="914400" rtl="0" eaLnBrk="1" latinLnBrk="0" hangingPunct="1">
         <a:spcBef>
           <a:spcPct val="20000"/>
         </a:spcBef>
-        <a:buFont typeface="Arial" pitchFamily="34" charset="0"/>
-        <a:buChar char="•"/>
-        <a:defRPr sz="3200" kern="1200">
+        <a:buClr>
+          <a:schemeClr val="accent1"/>
+        </a:buClr>
+        <a:buFont typeface="Wingdings 2" pitchFamily="18" charset="2"/>
+        <a:buChar char=""/>
+        <a:defRPr sz="2000" kern="1200" spc="150" baseline="0">
           <a:solidFill>
-            <a:schemeClr val="tx1"/>
+            <a:schemeClr val="tx2"/>
           </a:solidFill>
           <a:latin typeface="+mn-lt"/>
           <a:ea typeface="+mn-ea"/>
           <a:cs typeface="+mn-cs"/>
         </a:defRPr>
       </a:lvl1pPr>
-      <a:lvl2pPr marL="742950" indent="-285750" algn="l" defTabSz="914400" rtl="0" eaLnBrk="1" latinLnBrk="0" hangingPunct="1">
+      <a:lvl2pPr marL="548640" indent="-182880" algn="l" defTabSz="914400" rtl="0" eaLnBrk="1" latinLnBrk="0" hangingPunct="1">
         <a:spcBef>
           <a:spcPct val="20000"/>
         </a:spcBef>
-        <a:buFont typeface="Arial" pitchFamily="34" charset="0"/>
-        <a:buChar char="–"/>
-        <a:defRPr sz="2800" kern="1200">
+        <a:buClr>
+          <a:schemeClr val="accent2"/>
+        </a:buClr>
+        <a:buFont typeface="Wingdings" pitchFamily="2" charset="2"/>
+        <a:buChar char="§"/>
+        <a:defRPr sz="1800" kern="1200" spc="100" baseline="0">
           <a:solidFill>
-            <a:schemeClr val="tx1"/>
+            <a:schemeClr val="tx2"/>
           </a:solidFill>
           <a:latin typeface="+mn-lt"/>
           <a:ea typeface="+mn-ea"/>
           <a:cs typeface="+mn-cs"/>
         </a:defRPr>
       </a:lvl2pPr>
-      <a:lvl3pPr marL="1143000" indent="-228600" algn="l" defTabSz="914400" rtl="0" eaLnBrk="1" latinLnBrk="0" hangingPunct="1">
+      <a:lvl3pPr marL="822960" indent="-182880" algn="l" defTabSz="914400" rtl="0" eaLnBrk="1" latinLnBrk="0" hangingPunct="1">
         <a:spcBef>
           <a:spcPct val="20000"/>
         </a:spcBef>
-        <a:buFont typeface="Arial" pitchFamily="34" charset="0"/>
-        <a:buChar char="•"/>
-        <a:defRPr sz="2400" kern="1200">
+        <a:buClr>
+          <a:schemeClr val="accent3"/>
+        </a:buClr>
+        <a:buFont typeface="Wingdings" pitchFamily="2" charset="2"/>
+        <a:buChar char="§"/>
+        <a:defRPr sz="1600" kern="1200" spc="100" baseline="0">
           <a:solidFill>
-            <a:schemeClr val="tx1"/>
+            <a:schemeClr val="tx2"/>
           </a:solidFill>
           <a:latin typeface="+mn-lt"/>
           <a:ea typeface="+mn-ea"/>
           <a:cs typeface="+mn-cs"/>
         </a:defRPr>
       </a:lvl3pPr>
-      <a:lvl4pPr marL="1600200" indent="-228600" algn="l" defTabSz="914400" rtl="0" eaLnBrk="1" latinLnBrk="0" hangingPunct="1">
+      <a:lvl4pPr marL="1097280" indent="-182880" algn="l" defTabSz="914400" rtl="0" eaLnBrk="1" latinLnBrk="0" hangingPunct="1">
         <a:spcBef>
           <a:spcPct val="20000"/>
         </a:spcBef>
-        <a:buFont typeface="Arial" pitchFamily="34" charset="0"/>
-        <a:buChar char="–"/>
-        <a:defRPr sz="2000" kern="1200">
+        <a:buClr>
+          <a:schemeClr val="accent4"/>
+        </a:buClr>
+        <a:buFont typeface="Wingdings" pitchFamily="2" charset="2"/>
+        <a:buChar char="§"/>
+        <a:defRPr sz="1400" kern="1200">
           <a:solidFill>
-            <a:schemeClr val="tx1"/>
+            <a:schemeClr val="tx2"/>
           </a:solidFill>
           <a:latin typeface="+mn-lt"/>
           <a:ea typeface="+mn-ea"/>
           <a:cs typeface="+mn-cs"/>
         </a:defRPr>
       </a:lvl4pPr>
-      <a:lvl5pPr marL="2057400" indent="-228600" algn="l" defTabSz="914400" rtl="0" eaLnBrk="1" latinLnBrk="0" hangingPunct="1">
+      <a:lvl5pPr marL="1280160" indent="-182880" algn="l" defTabSz="914400" rtl="0" eaLnBrk="1" latinLnBrk="0" hangingPunct="1">
         <a:spcBef>
           <a:spcPct val="20000"/>
         </a:spcBef>
-        <a:buFont typeface="Arial" pitchFamily="34" charset="0"/>
-        <a:buChar char="»"/>
-        <a:defRPr sz="2000" kern="1200">
+        <a:buClr>
+          <a:schemeClr val="accent6"/>
+        </a:buClr>
+        <a:buFont typeface="Wingdings" pitchFamily="2" charset="2"/>
+        <a:buChar char="§"/>
+        <a:defRPr sz="1300" kern="1200" spc="100" baseline="0">
           <a:solidFill>
-            <a:schemeClr val="tx1"/>
+            <a:schemeClr val="tx2"/>
           </a:solidFill>
           <a:latin typeface="+mn-lt"/>
           <a:ea typeface="+mn-ea"/>
           <a:cs typeface="+mn-cs"/>
         </a:defRPr>
       </a:lvl5pPr>
-      <a:lvl6pPr marL="2514600" indent="-228600" algn="l" defTabSz="914400" rtl="0" eaLnBrk="1" latinLnBrk="0" hangingPunct="1">
+      <a:lvl6pPr marL="1554480" indent="-182880" algn="l" defTabSz="914400" rtl="0" eaLnBrk="1" latinLnBrk="0" hangingPunct="1">
         <a:spcBef>
           <a:spcPct val="20000"/>
         </a:spcBef>
-        <a:buFont typeface="Arial" pitchFamily="34" charset="0"/>
-        <a:buChar char="•"/>
-        <a:defRPr sz="2000" kern="1200">
+        <a:buClr>
+          <a:schemeClr val="accent1"/>
+        </a:buClr>
+        <a:buFont typeface="Wingdings" pitchFamily="2" charset="2"/>
+        <a:buChar char="§"/>
+        <a:defRPr sz="1200" kern="1200">
           <a:solidFill>
-            <a:schemeClr val="tx1"/>
+            <a:schemeClr val="tx2"/>
           </a:solidFill>
           <a:latin typeface="+mn-lt"/>
           <a:ea typeface="+mn-ea"/>
           <a:cs typeface="+mn-cs"/>
         </a:defRPr>
       </a:lvl6pPr>
-      <a:lvl7pPr marL="2971800" indent="-228600" algn="l" defTabSz="914400" rtl="0" eaLnBrk="1" latinLnBrk="0" hangingPunct="1">
+      <a:lvl7pPr marL="1828800" indent="-182880" algn="l" defTabSz="914400" rtl="0" eaLnBrk="1" latinLnBrk="0" hangingPunct="1">
         <a:spcBef>
           <a:spcPct val="20000"/>
         </a:spcBef>
-        <a:buFont typeface="Arial" pitchFamily="34" charset="0"/>
-        <a:buChar char="•"/>
-        <a:defRPr sz="2000" kern="1200">
+        <a:buClr>
+          <a:schemeClr val="accent2"/>
+        </a:buClr>
+        <a:buFont typeface="Wingdings" pitchFamily="2" charset="2"/>
+        <a:buChar char="§"/>
+        <a:defRPr sz="1200" kern="1200">
           <a:solidFill>
-            <a:schemeClr val="tx1"/>
+            <a:schemeClr val="tx2"/>
           </a:solidFill>
           <a:latin typeface="+mn-lt"/>
           <a:ea typeface="+mn-ea"/>
           <a:cs typeface="+mn-cs"/>
         </a:defRPr>
       </a:lvl7pPr>
-      <a:lvl8pPr marL="3429000" indent="-228600" algn="l" defTabSz="914400" rtl="0" eaLnBrk="1" latinLnBrk="0" hangingPunct="1">
+      <a:lvl8pPr marL="2103120" indent="-182880" algn="l" defTabSz="914400" rtl="0" eaLnBrk="1" latinLnBrk="0" hangingPunct="1">
         <a:spcBef>
           <a:spcPct val="20000"/>
         </a:spcBef>
-        <a:buFont typeface="Arial" pitchFamily="34" charset="0"/>
-        <a:buChar char="•"/>
-        <a:defRPr sz="2000" kern="1200">
+        <a:buClr>
+          <a:schemeClr val="accent3"/>
+        </a:buClr>
+        <a:buFont typeface="Wingdings" pitchFamily="2" charset="2"/>
+        <a:buChar char="§"/>
+        <a:defRPr sz="1200" kern="1200">
           <a:solidFill>
-            <a:schemeClr val="tx1"/>
+            <a:schemeClr val="tx2"/>
           </a:solidFill>
           <a:latin typeface="+mn-lt"/>
           <a:ea typeface="+mn-ea"/>
           <a:cs typeface="+mn-cs"/>
         </a:defRPr>
       </a:lvl8pPr>
-      <a:lvl9pPr marL="3886200" indent="-228600" algn="l" defTabSz="914400" rtl="0" eaLnBrk="1" latinLnBrk="0" hangingPunct="1">
+      <a:lvl9pPr marL="2377440" indent="-182880" algn="l" defTabSz="914400" rtl="0" eaLnBrk="1" latinLnBrk="0" hangingPunct="1">
         <a:spcBef>
           <a:spcPct val="20000"/>
         </a:spcBef>
-        <a:buFont typeface="Arial" pitchFamily="34" charset="0"/>
-        <a:buChar char="•"/>
-        <a:defRPr sz="2000" kern="1200">
+        <a:buClr>
+          <a:schemeClr val="accent5"/>
+        </a:buClr>
+        <a:buFont typeface="Wingdings" pitchFamily="2" charset="2"/>
+        <a:buChar char="§"/>
+        <a:defRPr sz="1200" kern="1200">
           <a:solidFill>
-            <a:schemeClr val="tx1"/>
+            <a:schemeClr val="tx2"/>
           </a:solidFill>
           <a:latin typeface="+mn-lt"/>
           <a:ea typeface="+mn-ea"/>
@@ -2918,7 +3690,7 @@
     </p:bodyStyle>
     <p:otherStyle>
       <a:defPPr>
-        <a:defRPr lang="es-ES"/>
+        <a:defRPr lang="en-US"/>
       </a:defPPr>
       <a:lvl1pPr marL="0" algn="l" defTabSz="914400" rtl="0" eaLnBrk="1" latinLnBrk="0" hangingPunct="1">
         <a:defRPr sz="1800" kern="1200">
@@ -3015,10 +3787,581 @@
 </p:sldMaster>
 </file>
 
+<file path=ppt/slides/slide1.xml><?xml version="1.0" encoding="utf-8"?>
+<p:sld xmlns:a="http://schemas.openxmlformats.org/drawingml/2006/main" xmlns:r="http://schemas.openxmlformats.org/officeDocument/2006/relationships" xmlns:p="http://schemas.openxmlformats.org/presentationml/2006/main">
+  <p:cSld>
+    <p:spTree>
+      <p:nvGrpSpPr>
+        <p:cNvPr id="1" name=""/>
+        <p:cNvGrpSpPr/>
+        <p:nvPr/>
+      </p:nvGrpSpPr>
+      <p:grpSpPr>
+        <a:xfrm>
+          <a:off x="0" y="0"/>
+          <a:ext cx="0" cy="0"/>
+          <a:chOff x="0" y="0"/>
+          <a:chExt cx="0" cy="0"/>
+        </a:xfrm>
+      </p:grpSpPr>
+      <p:sp>
+        <p:nvSpPr>
+          <p:cNvPr id="3" name="2 Subtítulo"/>
+          <p:cNvSpPr>
+            <a:spLocks noGrp="1"/>
+          </p:cNvSpPr>
+          <p:nvPr>
+            <p:ph type="subTitle" idx="1"/>
+          </p:nvPr>
+        </p:nvSpPr>
+        <p:spPr/>
+        <p:txBody>
+          <a:bodyPr/>
+          <a:lstStyle/>
+          <a:p>
+            <a:endParaRPr lang="es-CL"/>
+          </a:p>
+        </p:txBody>
+      </p:sp>
+      <p:sp>
+        <p:nvSpPr>
+          <p:cNvPr id="2" name="1 Título"/>
+          <p:cNvSpPr>
+            <a:spLocks noGrp="1"/>
+          </p:cNvSpPr>
+          <p:nvPr>
+            <p:ph type="title"/>
+          </p:nvPr>
+        </p:nvSpPr>
+        <p:spPr/>
+        <p:txBody>
+          <a:bodyPr/>
+          <a:lstStyle/>
+          <a:p>
+            <a:pPr algn="ctr"/>
+            <a:r>
+              <a:rPr lang="es-CL" dirty="0" smtClean="0">
+                <a:latin typeface="Arial" panose="020B0604020202020204" pitchFamily="34" charset="0"/>
+                <a:cs typeface="Arial" panose="020B0604020202020204" pitchFamily="34" charset="0"/>
+              </a:rPr>
+              <a:t>Tarea 2</a:t>
+            </a:r>
+            <a:endParaRPr lang="es-CL" dirty="0">
+              <a:latin typeface="Arial" panose="020B0604020202020204" pitchFamily="34" charset="0"/>
+              <a:cs typeface="Arial" panose="020B0604020202020204" pitchFamily="34" charset="0"/>
+            </a:endParaRPr>
+          </a:p>
+        </p:txBody>
+      </p:sp>
+    </p:spTree>
+    <p:extLst>
+      <p:ext uri="{BB962C8B-B14F-4D97-AF65-F5344CB8AC3E}">
+        <p14:creationId xmlns:p14="http://schemas.microsoft.com/office/powerpoint/2010/main" val="1471488608"/>
+      </p:ext>
+    </p:extLst>
+  </p:cSld>
+  <p:clrMapOvr>
+    <a:masterClrMapping/>
+  </p:clrMapOvr>
+</p:sld>
+</file>
+
+<file path=ppt/slides/slide2.xml><?xml version="1.0" encoding="utf-8"?>
+<p:sld xmlns:a="http://schemas.openxmlformats.org/drawingml/2006/main" xmlns:r="http://schemas.openxmlformats.org/officeDocument/2006/relationships" xmlns:p="http://schemas.openxmlformats.org/presentationml/2006/main">
+  <p:cSld>
+    <p:spTree>
+      <p:nvGrpSpPr>
+        <p:cNvPr id="1" name=""/>
+        <p:cNvGrpSpPr/>
+        <p:nvPr/>
+      </p:nvGrpSpPr>
+      <p:grpSpPr>
+        <a:xfrm>
+          <a:off x="0" y="0"/>
+          <a:ext cx="0" cy="0"/>
+          <a:chOff x="0" y="0"/>
+          <a:chExt cx="0" cy="0"/>
+        </a:xfrm>
+      </p:grpSpPr>
+      <p:sp>
+        <p:nvSpPr>
+          <p:cNvPr id="2" name="1 Marcador de contenido"/>
+          <p:cNvSpPr>
+            <a:spLocks noGrp="1"/>
+          </p:cNvSpPr>
+          <p:nvPr>
+            <p:ph idx="1"/>
+          </p:nvPr>
+        </p:nvSpPr>
+        <p:spPr/>
+        <p:txBody>
+          <a:bodyPr/>
+          <a:lstStyle/>
+          <a:p>
+            <a:r>
+              <a:rPr lang="es-CL" dirty="0"/>
+              <a:t>Enlace: https://pokemondb.net/pokedex/all</a:t>
+            </a:r>
+          </a:p>
+        </p:txBody>
+      </p:sp>
+      <p:sp>
+        <p:nvSpPr>
+          <p:cNvPr id="3" name="2 Título"/>
+          <p:cNvSpPr>
+            <a:spLocks noGrp="1"/>
+          </p:cNvSpPr>
+          <p:nvPr>
+            <p:ph type="title"/>
+          </p:nvPr>
+        </p:nvSpPr>
+        <p:spPr/>
+        <p:txBody>
+          <a:bodyPr/>
+          <a:lstStyle/>
+          <a:p>
+            <a:r>
+              <a:rPr lang="es-CL" dirty="0" smtClean="0">
+                <a:latin typeface="Arial" panose="020B0604020202020204" pitchFamily="34" charset="0"/>
+                <a:cs typeface="Arial" panose="020B0604020202020204" pitchFamily="34" charset="0"/>
+              </a:rPr>
+              <a:t>Pagina web</a:t>
+            </a:r>
+            <a:endParaRPr lang="es-CL" dirty="0">
+              <a:latin typeface="Arial" panose="020B0604020202020204" pitchFamily="34" charset="0"/>
+              <a:cs typeface="Arial" panose="020B0604020202020204" pitchFamily="34" charset="0"/>
+            </a:endParaRPr>
+          </a:p>
+        </p:txBody>
+      </p:sp>
+      <p:pic>
+        <p:nvPicPr>
+          <p:cNvPr id="1026" name="Picture 2" descr="C:\Users\Pantakill\Desktop\Captura.JPG"/>
+          <p:cNvPicPr>
+            <a:picLocks noChangeAspect="1" noChangeArrowheads="1"/>
+          </p:cNvPicPr>
+          <p:nvPr/>
+        </p:nvPicPr>
+        <p:blipFill>
+          <a:blip r:embed="rId2">
+            <a:extLst>
+              <a:ext uri="{28A0092B-C50C-407E-A947-70E740481C1C}">
+                <a14:useLocalDpi xmlns:a14="http://schemas.microsoft.com/office/drawing/2010/main" val="0"/>
+              </a:ext>
+            </a:extLst>
+          </a:blip>
+          <a:srcRect/>
+          <a:stretch>
+            <a:fillRect/>
+          </a:stretch>
+        </p:blipFill>
+        <p:spPr bwMode="auto">
+          <a:xfrm>
+            <a:off x="1249033" y="2204864"/>
+            <a:ext cx="5918110" cy="2952328"/>
+          </a:xfrm>
+          <a:prstGeom prst="rect">
+            <a:avLst/>
+          </a:prstGeom>
+          <a:noFill/>
+          <a:extLst>
+            <a:ext uri="{909E8E84-426E-40DD-AFC4-6F175D3DCCD1}">
+              <a14:hiddenFill xmlns:a14="http://schemas.microsoft.com/office/drawing/2010/main">
+                <a:solidFill>
+                  <a:srgbClr val="FFFFFF"/>
+                </a:solidFill>
+              </a14:hiddenFill>
+            </a:ext>
+          </a:extLst>
+        </p:spPr>
+      </p:pic>
+      <p:sp>
+        <p:nvSpPr>
+          <p:cNvPr id="4" name="3 CuadroTexto"/>
+          <p:cNvSpPr txBox="1"/>
+          <p:nvPr/>
+        </p:nvSpPr>
+        <p:spPr>
+          <a:xfrm>
+            <a:off x="971600" y="5661248"/>
+            <a:ext cx="6552728" cy="369332"/>
+          </a:xfrm>
+          <a:prstGeom prst="rect">
+            <a:avLst/>
+          </a:prstGeom>
+          <a:noFill/>
+        </p:spPr>
+        <p:txBody>
+          <a:bodyPr wrap="square" rtlCol="0">
+            <a:spAutoFit/>
+          </a:bodyPr>
+          <a:lstStyle/>
+          <a:p>
+            <a:r>
+              <a:rPr lang="es-CL" dirty="0" smtClean="0">
+                <a:latin typeface="Arial" panose="020B0604020202020204" pitchFamily="34" charset="0"/>
+                <a:cs typeface="Arial" panose="020B0604020202020204" pitchFamily="34" charset="0"/>
+              </a:rPr>
+              <a:t>Numero total de </a:t>
+            </a:r>
+            <a:r>
+              <a:rPr lang="es-CL" dirty="0" err="1" smtClean="0">
+                <a:latin typeface="Arial" panose="020B0604020202020204" pitchFamily="34" charset="0"/>
+                <a:cs typeface="Arial" panose="020B0604020202020204" pitchFamily="34" charset="0"/>
+              </a:rPr>
+              <a:t>pokemons</a:t>
+            </a:r>
+            <a:r>
+              <a:rPr lang="es-CL" dirty="0" smtClean="0">
+                <a:latin typeface="Arial" panose="020B0604020202020204" pitchFamily="34" charset="0"/>
+                <a:cs typeface="Arial" panose="020B0604020202020204" pitchFamily="34" charset="0"/>
+              </a:rPr>
+              <a:t> a la fecha en la pagina : 1216</a:t>
+            </a:r>
+            <a:endParaRPr lang="es-CL" dirty="0">
+              <a:latin typeface="Arial" panose="020B0604020202020204" pitchFamily="34" charset="0"/>
+              <a:cs typeface="Arial" panose="020B0604020202020204" pitchFamily="34" charset="0"/>
+            </a:endParaRPr>
+          </a:p>
+        </p:txBody>
+      </p:sp>
+    </p:spTree>
+    <p:extLst>
+      <p:ext uri="{BB962C8B-B14F-4D97-AF65-F5344CB8AC3E}">
+        <p14:creationId xmlns:p14="http://schemas.microsoft.com/office/powerpoint/2010/main" val="2989891203"/>
+      </p:ext>
+    </p:extLst>
+  </p:cSld>
+  <p:clrMapOvr>
+    <a:masterClrMapping/>
+  </p:clrMapOvr>
+</p:sld>
+</file>
+
+<file path=ppt/slides/slide3.xml><?xml version="1.0" encoding="utf-8"?>
+<p:sld xmlns:a="http://schemas.openxmlformats.org/drawingml/2006/main" xmlns:r="http://schemas.openxmlformats.org/officeDocument/2006/relationships" xmlns:p="http://schemas.openxmlformats.org/presentationml/2006/main">
+  <p:cSld>
+    <p:spTree>
+      <p:nvGrpSpPr>
+        <p:cNvPr id="1" name=""/>
+        <p:cNvGrpSpPr/>
+        <p:nvPr/>
+      </p:nvGrpSpPr>
+      <p:grpSpPr>
+        <a:xfrm>
+          <a:off x="0" y="0"/>
+          <a:ext cx="0" cy="0"/>
+          <a:chOff x="0" y="0"/>
+          <a:chExt cx="0" cy="0"/>
+        </a:xfrm>
+      </p:grpSpPr>
+      <p:sp>
+        <p:nvSpPr>
+          <p:cNvPr id="2" name="1 Marcador de contenido"/>
+          <p:cNvSpPr>
+            <a:spLocks noGrp="1"/>
+          </p:cNvSpPr>
+          <p:nvPr>
+            <p:ph idx="1"/>
+          </p:nvPr>
+        </p:nvSpPr>
+        <p:spPr/>
+        <p:txBody>
+          <a:bodyPr/>
+          <a:lstStyle/>
+          <a:p>
+            <a:r>
+              <a:rPr lang="es-CL" dirty="0" smtClean="0"/>
+              <a:t>Bibliotecas importadas : os</a:t>
+            </a:r>
+            <a:r>
+              <a:rPr lang="es-CL" dirty="0"/>
+              <a:t>, </a:t>
+            </a:r>
+            <a:r>
+              <a:rPr lang="es-CL" dirty="0" err="1" smtClean="0"/>
+              <a:t>requests</a:t>
+            </a:r>
+            <a:r>
+              <a:rPr lang="es-CL" dirty="0"/>
+              <a:t>, pandas, </a:t>
+            </a:r>
+            <a:r>
+              <a:rPr lang="es-CL" dirty="0" err="1" smtClean="0"/>
+              <a:t>BeautifulSoup</a:t>
+            </a:r>
+            <a:r>
+              <a:rPr lang="es-CL" dirty="0"/>
+              <a:t>, </a:t>
+            </a:r>
+            <a:r>
+              <a:rPr lang="es-CL" dirty="0" smtClean="0"/>
+              <a:t>date time</a:t>
+            </a:r>
+          </a:p>
+          <a:p>
+            <a:r>
+              <a:rPr lang="es-CL" dirty="0" smtClean="0"/>
+              <a:t>El método fue </a:t>
+            </a:r>
+            <a:r>
+              <a:rPr lang="es-CL" dirty="0" err="1" smtClean="0"/>
+              <a:t>Parsers</a:t>
+            </a:r>
+            <a:r>
+              <a:rPr lang="es-CL" dirty="0" smtClean="0"/>
+              <a:t> </a:t>
+            </a:r>
+            <a:r>
+              <a:rPr lang="es-CL" dirty="0"/>
+              <a:t>de </a:t>
+            </a:r>
+            <a:r>
+              <a:rPr lang="es-CL" dirty="0" smtClean="0"/>
+              <a:t>HTML</a:t>
+            </a:r>
+          </a:p>
+          <a:p>
+            <a:pPr marL="45720" indent="0">
+              <a:buNone/>
+            </a:pPr>
+            <a:endParaRPr lang="es-CL" dirty="0"/>
+          </a:p>
+        </p:txBody>
+      </p:sp>
+      <p:sp>
+        <p:nvSpPr>
+          <p:cNvPr id="3" name="2 Título"/>
+          <p:cNvSpPr>
+            <a:spLocks noGrp="1"/>
+          </p:cNvSpPr>
+          <p:nvPr>
+            <p:ph type="title"/>
+          </p:nvPr>
+        </p:nvSpPr>
+        <p:spPr/>
+        <p:txBody>
+          <a:bodyPr/>
+          <a:lstStyle/>
+          <a:p>
+            <a:r>
+              <a:rPr lang="es-CL" dirty="0" smtClean="0"/>
+              <a:t>Tecnologías usadas</a:t>
+            </a:r>
+            <a:endParaRPr lang="es-CL" dirty="0"/>
+          </a:p>
+        </p:txBody>
+      </p:sp>
+      <p:pic>
+        <p:nvPicPr>
+          <p:cNvPr id="2050" name="Picture 2" descr="C:\Users\Pantakill\Desktop\Captura.JPG"/>
+          <p:cNvPicPr>
+            <a:picLocks noChangeAspect="1" noChangeArrowheads="1"/>
+          </p:cNvPicPr>
+          <p:nvPr/>
+        </p:nvPicPr>
+        <p:blipFill>
+          <a:blip r:embed="rId2">
+            <a:extLst>
+              <a:ext uri="{28A0092B-C50C-407E-A947-70E740481C1C}">
+                <a14:useLocalDpi xmlns:a14="http://schemas.microsoft.com/office/drawing/2010/main" val="0"/>
+              </a:ext>
+            </a:extLst>
+          </a:blip>
+          <a:srcRect/>
+          <a:stretch>
+            <a:fillRect/>
+          </a:stretch>
+        </p:blipFill>
+        <p:spPr bwMode="auto">
+          <a:xfrm>
+            <a:off x="2411760" y="3327825"/>
+            <a:ext cx="2514600" cy="1047750"/>
+          </a:xfrm>
+          <a:prstGeom prst="rect">
+            <a:avLst/>
+          </a:prstGeom>
+          <a:noFill/>
+          <a:extLst>
+            <a:ext uri="{909E8E84-426E-40DD-AFC4-6F175D3DCCD1}">
+              <a14:hiddenFill xmlns:a14="http://schemas.microsoft.com/office/drawing/2010/main">
+                <a:solidFill>
+                  <a:srgbClr val="FFFFFF"/>
+                </a:solidFill>
+              </a14:hiddenFill>
+            </a:ext>
+          </a:extLst>
+        </p:spPr>
+      </p:pic>
+      <p:sp>
+        <p:nvSpPr>
+          <p:cNvPr id="4" name="3 CuadroTexto"/>
+          <p:cNvSpPr txBox="1"/>
+          <p:nvPr/>
+        </p:nvSpPr>
+        <p:spPr>
+          <a:xfrm>
+            <a:off x="1331640" y="4581128"/>
+            <a:ext cx="5328592" cy="369332"/>
+          </a:xfrm>
+          <a:prstGeom prst="rect">
+            <a:avLst/>
+          </a:prstGeom>
+          <a:noFill/>
+        </p:spPr>
+        <p:txBody>
+          <a:bodyPr wrap="square" rtlCol="0">
+            <a:spAutoFit/>
+          </a:bodyPr>
+          <a:lstStyle/>
+          <a:p>
+            <a:r>
+              <a:rPr lang="es-CL" dirty="0" smtClean="0">
+                <a:latin typeface="Arial" panose="020B0604020202020204" pitchFamily="34" charset="0"/>
+                <a:cs typeface="Arial" panose="020B0604020202020204" pitchFamily="34" charset="0"/>
+              </a:rPr>
+              <a:t>*(se utilizo </a:t>
+            </a:r>
+            <a:r>
+              <a:rPr lang="es-CL" dirty="0" err="1" smtClean="0">
+                <a:latin typeface="Arial" panose="020B0604020202020204" pitchFamily="34" charset="0"/>
+                <a:cs typeface="Arial" panose="020B0604020202020204" pitchFamily="34" charset="0"/>
+              </a:rPr>
+              <a:t>jupyter</a:t>
+            </a:r>
+            <a:r>
+              <a:rPr lang="es-CL" dirty="0" smtClean="0">
+                <a:latin typeface="Arial" panose="020B0604020202020204" pitchFamily="34" charset="0"/>
+                <a:cs typeface="Arial" panose="020B0604020202020204" pitchFamily="34" charset="0"/>
+              </a:rPr>
+              <a:t> notebook(</a:t>
+            </a:r>
+            <a:r>
+              <a:rPr lang="es-CL" dirty="0" err="1" smtClean="0">
+                <a:latin typeface="Arial" panose="020B0604020202020204" pitchFamily="34" charset="0"/>
+                <a:cs typeface="Arial" panose="020B0604020202020204" pitchFamily="34" charset="0"/>
+              </a:rPr>
+              <a:t>python</a:t>
+            </a:r>
+            <a:r>
+              <a:rPr lang="es-CL" dirty="0" smtClean="0">
+                <a:latin typeface="Arial" panose="020B0604020202020204" pitchFamily="34" charset="0"/>
+                <a:cs typeface="Arial" panose="020B0604020202020204" pitchFamily="34" charset="0"/>
+              </a:rPr>
+              <a:t>))</a:t>
+            </a:r>
+            <a:endParaRPr lang="es-CL" dirty="0">
+              <a:latin typeface="Arial" panose="020B0604020202020204" pitchFamily="34" charset="0"/>
+              <a:cs typeface="Arial" panose="020B0604020202020204" pitchFamily="34" charset="0"/>
+            </a:endParaRPr>
+          </a:p>
+        </p:txBody>
+      </p:sp>
+    </p:spTree>
+    <p:extLst>
+      <p:ext uri="{BB962C8B-B14F-4D97-AF65-F5344CB8AC3E}">
+        <p14:creationId xmlns:p14="http://schemas.microsoft.com/office/powerpoint/2010/main" val="4121230384"/>
+      </p:ext>
+    </p:extLst>
+  </p:cSld>
+  <p:clrMapOvr>
+    <a:masterClrMapping/>
+  </p:clrMapOvr>
+</p:sld>
+</file>
+
+<file path=ppt/slides/slide4.xml><?xml version="1.0" encoding="utf-8"?>
+<p:sld xmlns:a="http://schemas.openxmlformats.org/drawingml/2006/main" xmlns:r="http://schemas.openxmlformats.org/officeDocument/2006/relationships" xmlns:p="http://schemas.openxmlformats.org/presentationml/2006/main">
+  <p:cSld>
+    <p:spTree>
+      <p:nvGrpSpPr>
+        <p:cNvPr id="1" name=""/>
+        <p:cNvGrpSpPr/>
+        <p:nvPr/>
+      </p:nvGrpSpPr>
+      <p:grpSpPr>
+        <a:xfrm>
+          <a:off x="0" y="0"/>
+          <a:ext cx="0" cy="0"/>
+          <a:chOff x="0" y="0"/>
+          <a:chExt cx="0" cy="0"/>
+        </a:xfrm>
+      </p:grpSpPr>
+      <p:sp>
+        <p:nvSpPr>
+          <p:cNvPr id="2" name="1 Marcador de contenido"/>
+          <p:cNvSpPr>
+            <a:spLocks noGrp="1"/>
+          </p:cNvSpPr>
+          <p:nvPr>
+            <p:ph idx="1"/>
+          </p:nvPr>
+        </p:nvSpPr>
+        <p:spPr/>
+        <p:txBody>
+          <a:bodyPr/>
+          <a:lstStyle/>
+          <a:p>
+            <a:r>
+              <a:rPr lang="es-CL" dirty="0" smtClean="0"/>
+              <a:t>Esta difícil la cosa</a:t>
+            </a:r>
+          </a:p>
+          <a:p>
+            <a:r>
+              <a:rPr lang="es-CL" dirty="0" smtClean="0"/>
+              <a:t>Elegir sabiamente la pagina a utilizar</a:t>
+            </a:r>
+          </a:p>
+          <a:p>
+            <a:r>
+              <a:rPr lang="es-CL" dirty="0" smtClean="0"/>
+              <a:t>Leer mucha documentación</a:t>
+            </a:r>
+            <a:endParaRPr lang="es-CL" dirty="0"/>
+          </a:p>
+        </p:txBody>
+      </p:sp>
+      <p:sp>
+        <p:nvSpPr>
+          <p:cNvPr id="3" name="2 Título"/>
+          <p:cNvSpPr>
+            <a:spLocks noGrp="1"/>
+          </p:cNvSpPr>
+          <p:nvPr>
+            <p:ph type="title"/>
+          </p:nvPr>
+        </p:nvSpPr>
+        <p:spPr/>
+        <p:txBody>
+          <a:bodyPr/>
+          <a:lstStyle/>
+          <a:p>
+            <a:r>
+              <a:rPr lang="es-CL" dirty="0" smtClean="0"/>
+              <a:t>Mis conclusiones y recomendaciones</a:t>
+            </a:r>
+            <a:endParaRPr lang="es-CL" dirty="0"/>
+          </a:p>
+        </p:txBody>
+      </p:sp>
+    </p:spTree>
+    <p:extLst>
+      <p:ext uri="{BB962C8B-B14F-4D97-AF65-F5344CB8AC3E}">
+        <p14:creationId xmlns:p14="http://schemas.microsoft.com/office/powerpoint/2010/main" val="1917750877"/>
+      </p:ext>
+    </p:extLst>
+  </p:cSld>
+  <p:clrMapOvr>
+    <a:masterClrMapping/>
+  </p:clrMapOvr>
+</p:sld>
+</file>
+
 <file path=ppt/theme/theme1.xml><?xml version="1.0" encoding="utf-8"?>
-<a:theme xmlns:a="http://schemas.openxmlformats.org/drawingml/2006/main" name="Tema de Office">
+<a:theme xmlns:a="http://schemas.openxmlformats.org/drawingml/2006/main" name="Cuadrícula">
   <a:themeElements>
-    <a:clrScheme name="Oficina">
+    <a:clrScheme name="Cuadrícula">
       <a:dk1>
         <a:sysClr val="windowText" lastClr="000000"/>
       </a:dk1>
@@ -3026,81 +4369,47 @@
         <a:sysClr val="window" lastClr="FFFFFF"/>
       </a:lt1>
       <a:dk2>
-        <a:srgbClr val="1F497D"/>
+        <a:srgbClr val="534949"/>
       </a:dk2>
       <a:lt2>
-        <a:srgbClr val="EEECE1"/>
+        <a:srgbClr val="CCD1B9"/>
       </a:lt2>
       <a:accent1>
-        <a:srgbClr val="4F81BD"/>
+        <a:srgbClr val="C66951"/>
       </a:accent1>
       <a:accent2>
-        <a:srgbClr val="C0504D"/>
+        <a:srgbClr val="BF974D"/>
       </a:accent2>
       <a:accent3>
-        <a:srgbClr val="9BBB59"/>
+        <a:srgbClr val="928B70"/>
       </a:accent3>
       <a:accent4>
-        <a:srgbClr val="8064A2"/>
+        <a:srgbClr val="87706B"/>
       </a:accent4>
       <a:accent5>
-        <a:srgbClr val="4BACC6"/>
+        <a:srgbClr val="94734E"/>
       </a:accent5>
       <a:accent6>
-        <a:srgbClr val="F79646"/>
+        <a:srgbClr val="6F777D"/>
       </a:accent6>
       <a:hlink>
-        <a:srgbClr val="0000FF"/>
+        <a:srgbClr val="CC9900"/>
       </a:hlink>
       <a:folHlink>
-        <a:srgbClr val="800080"/>
+        <a:srgbClr val="C0C0C0"/>
       </a:folHlink>
     </a:clrScheme>
-    <a:fontScheme name="Oficina">
+    <a:fontScheme name="Cuadrícula">
       <a:majorFont>
-        <a:latin typeface="Calibri"/>
+        <a:latin typeface="Franklin Gothic Medium"/>
         <a:ea typeface=""/>
         <a:cs typeface=""/>
-        <a:font script="Jpan" typeface="ＭＳ Ｐゴシック"/>
-        <a:font script="Hang" typeface="맑은 고딕"/>
-        <a:font script="Hans" typeface="宋体"/>
-        <a:font script="Hant" typeface="新細明體"/>
-        <a:font script="Arab" typeface="Times New Roman"/>
-        <a:font script="Hebr" typeface="Times New Roman"/>
-        <a:font script="Thai" typeface="Angsana New"/>
-        <a:font script="Ethi" typeface="Nyala"/>
-        <a:font script="Beng" typeface="Vrinda"/>
-        <a:font script="Gujr" typeface="Shruti"/>
-        <a:font script="Khmr" typeface="MoolBoran"/>
-        <a:font script="Knda" typeface="Tunga"/>
-        <a:font script="Guru" typeface="Raavi"/>
-        <a:font script="Cans" typeface="Euphemia"/>
-        <a:font script="Cher" typeface="Plantagenet Cherokee"/>
-        <a:font script="Yiii" typeface="Microsoft Yi Baiti"/>
-        <a:font script="Tibt" typeface="Microsoft Himalaya"/>
-        <a:font script="Thaa" typeface="MV Boli"/>
-        <a:font script="Deva" typeface="Mangal"/>
-        <a:font script="Telu" typeface="Gautami"/>
-        <a:font script="Taml" typeface="Latha"/>
-        <a:font script="Syrc" typeface="Estrangelo Edessa"/>
-        <a:font script="Orya" typeface="Kalinga"/>
-        <a:font script="Mlym" typeface="Kartika"/>
-        <a:font script="Laoo" typeface="DokChampa"/>
-        <a:font script="Sinh" typeface="Iskoola Pota"/>
-        <a:font script="Mong" typeface="Mongolian Baiti"/>
-        <a:font script="Viet" typeface="Times New Roman"/>
-        <a:font script="Uigh" typeface="Microsoft Uighur"/>
-      </a:majorFont>
-      <a:minorFont>
-        <a:latin typeface="Calibri"/>
-        <a:ea typeface=""/>
-        <a:cs typeface=""/>
-        <a:font script="Jpan" typeface="ＭＳ Ｐゴシック"/>
-        <a:font script="Hang" typeface="맑은 고딕"/>
-        <a:font script="Hans" typeface="宋体"/>
-        <a:font script="Hant" typeface="新細明體"/>
-        <a:font script="Arab" typeface="Arial"/>
-        <a:font script="Hebr" typeface="Arial"/>
+        <a:font script="Jpan" typeface="HG創英角ｺﾞｼｯｸUB"/>
+        <a:font script="Hang" typeface="HY견고딕"/>
+        <a:font script="Hans" typeface="微软雅黑"/>
+        <a:font script="Hant" typeface="微軟正黑體"/>
+        <a:font script="Arab" typeface="Arial Bold"/>
+        <a:font script="Hebr" typeface="Arial Bold"/>
         <a:font script="Thai" typeface="Cordia New"/>
         <a:font script="Ethi" typeface="Nyala"/>
         <a:font script="Beng" typeface="Vrinda"/>
@@ -3122,79 +4431,91 @@
         <a:font script="Laoo" typeface="DokChampa"/>
         <a:font script="Sinh" typeface="Iskoola Pota"/>
         <a:font script="Mong" typeface="Mongolian Baiti"/>
-        <a:font script="Viet" typeface="Arial"/>
+        <a:font script="Viet" typeface="Arial Bold"/>
         <a:font script="Uigh" typeface="Microsoft Uighur"/>
+        <a:font script="Geor" typeface="Sylfaen"/>
+      </a:majorFont>
+      <a:minorFont>
+        <a:latin typeface="Franklin Gothic Medium"/>
+        <a:ea typeface=""/>
+        <a:cs typeface=""/>
+        <a:font script="Jpan" typeface="HG創英角ｺﾞｼｯｸUB"/>
+        <a:font script="Hang" typeface="HY견고딕"/>
+        <a:font script="Hans" typeface="微软雅黑"/>
+        <a:font script="Hant" typeface="微軟正黑體"/>
+        <a:font script="Arab" typeface="Arial Bold"/>
+        <a:font script="Hebr" typeface="Arial Bold"/>
+        <a:font script="Thai" typeface="Cordia New"/>
+        <a:font script="Ethi" typeface="Nyala"/>
+        <a:font script="Beng" typeface="Vrinda"/>
+        <a:font script="Gujr" typeface="Shruti"/>
+        <a:font script="Khmr" typeface="DaunPenh"/>
+        <a:font script="Knda" typeface="Tunga"/>
+        <a:font script="Guru" typeface="Raavi"/>
+        <a:font script="Cans" typeface="Euphemia"/>
+        <a:font script="Cher" typeface="Plantagenet Cherokee"/>
+        <a:font script="Yiii" typeface="Microsoft Yi Baiti"/>
+        <a:font script="Tibt" typeface="Microsoft Himalaya"/>
+        <a:font script="Thaa" typeface="MV Boli"/>
+        <a:font script="Deva" typeface="Mangal"/>
+        <a:font script="Telu" typeface="Gautami"/>
+        <a:font script="Taml" typeface="Latha"/>
+        <a:font script="Syrc" typeface="Estrangelo Edessa"/>
+        <a:font script="Orya" typeface="Kalinga"/>
+        <a:font script="Mlym" typeface="Kartika"/>
+        <a:font script="Laoo" typeface="DokChampa"/>
+        <a:font script="Sinh" typeface="Iskoola Pota"/>
+        <a:font script="Mong" typeface="Mongolian Baiti"/>
+        <a:font script="Viet" typeface="Arial Bold"/>
+        <a:font script="Uigh" typeface="Microsoft Uighur"/>
+        <a:font script="Geor" typeface="Sylfaen"/>
       </a:minorFont>
     </a:fontScheme>
-    <a:fmtScheme name="Oficina">
+    <a:fmtScheme name="Cuadrícula">
       <a:fillStyleLst>
         <a:solidFill>
           <a:schemeClr val="phClr"/>
         </a:solidFill>
+        <a:solidFill>
+          <a:schemeClr val="phClr">
+            <a:tint val="50000"/>
+          </a:schemeClr>
+        </a:solidFill>
         <a:gradFill rotWithShape="1">
           <a:gsLst>
             <a:gs pos="0">
+              <a:schemeClr val="phClr"/>
+            </a:gs>
+            <a:gs pos="90000">
               <a:schemeClr val="phClr">
-                <a:tint val="50000"/>
-                <a:satMod val="300000"/>
-              </a:schemeClr>
-            </a:gs>
-            <a:gs pos="35000">
-              <a:schemeClr val="phClr">
-                <a:tint val="37000"/>
-                <a:satMod val="300000"/>
+                <a:shade val="100000"/>
               </a:schemeClr>
             </a:gs>
             <a:gs pos="100000">
               <a:schemeClr val="phClr">
-                <a:tint val="15000"/>
-                <a:satMod val="350000"/>
+                <a:shade val="85000"/>
               </a:schemeClr>
             </a:gs>
           </a:gsLst>
-          <a:lin ang="16200000" scaled="1"/>
-        </a:gradFill>
-        <a:gradFill rotWithShape="1">
-          <a:gsLst>
-            <a:gs pos="0">
-              <a:schemeClr val="phClr">
-                <a:shade val="51000"/>
-                <a:satMod val="130000"/>
-              </a:schemeClr>
-            </a:gs>
-            <a:gs pos="80000">
-              <a:schemeClr val="phClr">
-                <a:shade val="93000"/>
-                <a:satMod val="130000"/>
-              </a:schemeClr>
-            </a:gs>
-            <a:gs pos="100000">
-              <a:schemeClr val="phClr">
-                <a:shade val="94000"/>
-                <a:satMod val="135000"/>
-              </a:schemeClr>
-            </a:gs>
-          </a:gsLst>
-          <a:lin ang="16200000" scaled="0"/>
+          <a:path path="circle">
+            <a:fillToRect l="100000" t="100000" r="100000" b="100000"/>
+          </a:path>
         </a:gradFill>
       </a:fillStyleLst>
       <a:lnStyleLst>
-        <a:ln w="9525" cap="flat" cmpd="sng" algn="ctr">
-          <a:solidFill>
-            <a:schemeClr val="phClr">
-              <a:shade val="95000"/>
-              <a:satMod val="105000"/>
-            </a:schemeClr>
-          </a:solidFill>
-          <a:prstDash val="solid"/>
-        </a:ln>
-        <a:ln w="25400" cap="flat" cmpd="sng" algn="ctr">
+        <a:ln w="10000" cap="flat" cmpd="sng" algn="ctr">
           <a:solidFill>
             <a:schemeClr val="phClr"/>
           </a:solidFill>
           <a:prstDash val="solid"/>
         </a:ln>
-        <a:ln w="38100" cap="flat" cmpd="sng" algn="ctr">
+        <a:ln w="19050" cap="flat" cmpd="sng" algn="ctr">
+          <a:solidFill>
+            <a:schemeClr val="phClr"/>
+          </a:solidFill>
+          <a:prstDash val="solid"/>
+        </a:ln>
+        <a:ln w="47625" cap="flat" cmpd="dbl" algn="ctr">
           <a:solidFill>
             <a:schemeClr val="phClr"/>
           </a:solidFill>
@@ -3203,28 +4524,22 @@
       </a:lnStyleLst>
       <a:effectStyleLst>
         <a:effectStyle>
+          <a:effectLst/>
+        </a:effectStyle>
+        <a:effectStyle>
           <a:effectLst>
-            <a:outerShdw blurRad="40000" dist="20000" dir="5400000" rotWithShape="0">
+            <a:outerShdw blurRad="31750" dist="25400" dir="5400000" rotWithShape="0">
               <a:srgbClr val="000000">
-                <a:alpha val="38000"/>
+                <a:alpha val="50000"/>
               </a:srgbClr>
             </a:outerShdw>
           </a:effectLst>
         </a:effectStyle>
         <a:effectStyle>
           <a:effectLst>
-            <a:outerShdw blurRad="40000" dist="23000" dir="5400000" rotWithShape="0">
+            <a:outerShdw blurRad="38100" dist="25400" dir="5400000" rotWithShape="0">
               <a:srgbClr val="000000">
-                <a:alpha val="35000"/>
-              </a:srgbClr>
-            </a:outerShdw>
-          </a:effectLst>
-        </a:effectStyle>
-        <a:effectStyle>
-          <a:effectLst>
-            <a:outerShdw blurRad="40000" dist="23000" dir="5400000" rotWithShape="0">
-              <a:srgbClr val="000000">
-                <a:alpha val="35000"/>
+                <a:alpha val="45000"/>
               </a:srgbClr>
             </a:outerShdw>
           </a:effectLst>
@@ -3232,12 +4547,15 @@
             <a:camera prst="orthographicFront">
               <a:rot lat="0" lon="0" rev="0"/>
             </a:camera>
-            <a:lightRig rig="threePt" dir="t">
-              <a:rot lat="0" lon="0" rev="1200000"/>
-            </a:lightRig>
+            <a:lightRig rig="brightRoom" dir="t"/>
           </a:scene3d>
-          <a:sp3d>
-            <a:bevelT w="63500" h="25400"/>
+          <a:sp3d extrusionH="12700" contourW="25400" prstMaterial="flat">
+            <a:bevelT w="63500" h="152400" prst="angle"/>
+            <a:contourClr>
+              <a:schemeClr val="phClr">
+                <a:shade val="30000"/>
+              </a:schemeClr>
+            </a:contourClr>
           </a:sp3d>
         </a:effectStyle>
       </a:effectStyleLst>
@@ -3245,51 +4563,27 @@
         <a:solidFill>
           <a:schemeClr val="phClr"/>
         </a:solidFill>
-        <a:gradFill rotWithShape="1">
-          <a:gsLst>
-            <a:gs pos="0">
+        <a:solidFill>
+          <a:schemeClr val="phClr">
+            <a:tint val="90000"/>
+            <a:shade val="93000"/>
+            <a:satMod val="150000"/>
+          </a:schemeClr>
+        </a:solidFill>
+        <a:blipFill rotWithShape="1">
+          <a:blip xmlns:r="http://schemas.openxmlformats.org/officeDocument/2006/relationships" r:embed="rId1">
+            <a:duotone>
               <a:schemeClr val="phClr">
-                <a:tint val="40000"/>
-                <a:satMod val="350000"/>
+                <a:tint val="95000"/>
               </a:schemeClr>
-            </a:gs>
-            <a:gs pos="40000">
               <a:schemeClr val="phClr">
-                <a:tint val="45000"/>
-                <a:shade val="99000"/>
-                <a:satMod val="350000"/>
+                <a:shade val="93000"/>
+                <a:satMod val="110000"/>
               </a:schemeClr>
-            </a:gs>
-            <a:gs pos="100000">
-              <a:schemeClr val="phClr">
-                <a:shade val="20000"/>
-                <a:satMod val="255000"/>
-              </a:schemeClr>
-            </a:gs>
-          </a:gsLst>
-          <a:path path="circle">
-            <a:fillToRect l="50000" t="-80000" r="50000" b="180000"/>
-          </a:path>
-        </a:gradFill>
-        <a:gradFill rotWithShape="1">
-          <a:gsLst>
-            <a:gs pos="0">
-              <a:schemeClr val="phClr">
-                <a:tint val="80000"/>
-                <a:satMod val="300000"/>
-              </a:schemeClr>
-            </a:gs>
-            <a:gs pos="100000">
-              <a:schemeClr val="phClr">
-                <a:shade val="30000"/>
-                <a:satMod val="200000"/>
-              </a:schemeClr>
-            </a:gs>
-          </a:gsLst>
-          <a:path path="circle">
-            <a:fillToRect l="50000" t="50000" r="50000" b="50000"/>
-          </a:path>
-        </a:gradFill>
+            </a:duotone>
+          </a:blip>
+          <a:tile tx="0" ty="0" sx="100000" sy="100000" flip="none" algn="tl"/>
+        </a:blipFill>
       </a:bgFillStyleLst>
     </a:fmtScheme>
   </a:themeElements>

</xml_diff>